<commit_message>
moved 'media query' to be after css and before js, as it is part of css added '<img>' tag next to '<audio>' and '<video>' tags what does písmo ve www even mean?
</commit_message>
<xml_diff>
--- a/NavrhWEB.pptx
+++ b/NavrhWEB.pptx
@@ -19,11 +19,12 @@
     <p:sldId id="267" r:id="rId13"/>
     <p:sldId id="269" r:id="rId14"/>
     <p:sldId id="268" r:id="rId15"/>
-    <p:sldId id="270" r:id="rId16"/>
-    <p:sldId id="271" r:id="rId17"/>
-    <p:sldId id="272" r:id="rId18"/>
-    <p:sldId id="273" r:id="rId19"/>
-    <p:sldId id="274" r:id="rId20"/>
+    <p:sldId id="274" r:id="rId16"/>
+    <p:sldId id="270" r:id="rId17"/>
+    <p:sldId id="271" r:id="rId18"/>
+    <p:sldId id="272" r:id="rId19"/>
+    <p:sldId id="273" r:id="rId20"/>
+    <p:sldId id="275" r:id="rId21"/>
   </p:sldIdLst>
   <p:sldSz cx="12192000" cy="6858000"/>
   <p:notesSz cx="6858000" cy="9144000"/>
@@ -122,6 +123,11 @@
       </a:defRPr>
     </a:lvl9pPr>
   </p:defaultTextStyle>
+  <p:extLst>
+    <p:ext uri="{EFAFB233-063F-42B5-8137-9DF3F51BA10A}">
+      <p15:sldGuideLst xmlns:p15="http://schemas.microsoft.com/office/powerpoint/2012/main"/>
+    </p:ext>
+  </p:extLst>
 </p:presentation>
 </file>
 
@@ -310,7 +316,7 @@
           <a:p>
             <a:fld id="{EE03B5A0-15F8-4C99-AFC1-956F43C85EF9}" type="datetimeFigureOut">
               <a:rPr lang="en-US" smtClean="0"/>
-              <a:t>1/26/2024</a:t>
+              <a:t>1/27/2024</a:t>
             </a:fld>
             <a:endParaRPr lang="en-US"/>
           </a:p>
@@ -608,7 +614,7 @@
           <a:p>
             <a:fld id="{EE03B5A0-15F8-4C99-AFC1-956F43C85EF9}" type="datetimeFigureOut">
               <a:rPr lang="en-US" smtClean="0"/>
-              <a:t>1/26/2024</a:t>
+              <a:t>1/27/2024</a:t>
             </a:fld>
             <a:endParaRPr lang="en-US"/>
           </a:p>
@@ -800,7 +806,7 @@
           <a:p>
             <a:fld id="{EE03B5A0-15F8-4C99-AFC1-956F43C85EF9}" type="datetimeFigureOut">
               <a:rPr lang="en-US" smtClean="0"/>
-              <a:t>1/26/2024</a:t>
+              <a:t>1/27/2024</a:t>
             </a:fld>
             <a:endParaRPr lang="en-US"/>
           </a:p>
@@ -1061,7 +1067,7 @@
           <a:p>
             <a:fld id="{EE03B5A0-15F8-4C99-AFC1-956F43C85EF9}" type="datetimeFigureOut">
               <a:rPr lang="en-US" smtClean="0"/>
-              <a:t>1/26/2024</a:t>
+              <a:t>1/27/2024</a:t>
             </a:fld>
             <a:endParaRPr lang="en-US"/>
           </a:p>
@@ -1485,7 +1491,7 @@
           <a:p>
             <a:fld id="{EE03B5A0-15F8-4C99-AFC1-956F43C85EF9}" type="datetimeFigureOut">
               <a:rPr lang="en-US" smtClean="0"/>
-              <a:t>1/26/2024</a:t>
+              <a:t>1/27/2024</a:t>
             </a:fld>
             <a:endParaRPr lang="en-US"/>
           </a:p>
@@ -2022,7 +2028,7 @@
           <a:p>
             <a:fld id="{EE03B5A0-15F8-4C99-AFC1-956F43C85EF9}" type="datetimeFigureOut">
               <a:rPr lang="en-US" smtClean="0"/>
-              <a:t>1/26/2024</a:t>
+              <a:t>1/27/2024</a:t>
             </a:fld>
             <a:endParaRPr lang="en-US"/>
           </a:p>
@@ -2886,7 +2892,7 @@
           <a:p>
             <a:fld id="{EE03B5A0-15F8-4C99-AFC1-956F43C85EF9}" type="datetimeFigureOut">
               <a:rPr lang="en-US" smtClean="0"/>
-              <a:t>1/26/2024</a:t>
+              <a:t>1/27/2024</a:t>
             </a:fld>
             <a:endParaRPr lang="en-US"/>
           </a:p>
@@ -3056,7 +3062,7 @@
           <a:p>
             <a:fld id="{EE03B5A0-15F8-4C99-AFC1-956F43C85EF9}" type="datetimeFigureOut">
               <a:rPr lang="en-US" smtClean="0"/>
-              <a:t>1/26/2024</a:t>
+              <a:t>1/27/2024</a:t>
             </a:fld>
             <a:endParaRPr lang="en-US"/>
           </a:p>
@@ -3240,7 +3246,7 @@
           <a:p>
             <a:fld id="{EE03B5A0-15F8-4C99-AFC1-956F43C85EF9}" type="datetimeFigureOut">
               <a:rPr lang="en-US" smtClean="0"/>
-              <a:t>1/26/2024</a:t>
+              <a:t>1/27/2024</a:t>
             </a:fld>
             <a:endParaRPr lang="en-US"/>
           </a:p>
@@ -3410,7 +3416,7 @@
           <a:p>
             <a:fld id="{EE03B5A0-15F8-4C99-AFC1-956F43C85EF9}" type="datetimeFigureOut">
               <a:rPr lang="en-US" smtClean="0"/>
-              <a:t>1/26/2024</a:t>
+              <a:t>1/27/2024</a:t>
             </a:fld>
             <a:endParaRPr lang="en-US"/>
           </a:p>
@@ -3654,7 +3660,7 @@
           <a:p>
             <a:fld id="{EE03B5A0-15F8-4C99-AFC1-956F43C85EF9}" type="datetimeFigureOut">
               <a:rPr lang="en-US" smtClean="0"/>
-              <a:t>1/26/2024</a:t>
+              <a:t>1/27/2024</a:t>
             </a:fld>
             <a:endParaRPr lang="en-US"/>
           </a:p>
@@ -3890,7 +3896,7 @@
           <a:p>
             <a:fld id="{EE03B5A0-15F8-4C99-AFC1-956F43C85EF9}" type="datetimeFigureOut">
               <a:rPr lang="en-US" smtClean="0"/>
-              <a:t>1/26/2024</a:t>
+              <a:t>1/27/2024</a:t>
             </a:fld>
             <a:endParaRPr lang="en-US"/>
           </a:p>
@@ -4356,7 +4362,7 @@
           <a:p>
             <a:fld id="{EE03B5A0-15F8-4C99-AFC1-956F43C85EF9}" type="datetimeFigureOut">
               <a:rPr lang="en-US" smtClean="0"/>
-              <a:t>1/26/2024</a:t>
+              <a:t>1/27/2024</a:t>
             </a:fld>
             <a:endParaRPr lang="en-US"/>
           </a:p>
@@ -4474,7 +4480,7 @@
           <a:p>
             <a:fld id="{EE03B5A0-15F8-4C99-AFC1-956F43C85EF9}" type="datetimeFigureOut">
               <a:rPr lang="en-US" smtClean="0"/>
-              <a:t>1/26/2024</a:t>
+              <a:t>1/27/2024</a:t>
             </a:fld>
             <a:endParaRPr lang="en-US"/>
           </a:p>
@@ -4569,7 +4575,7 @@
           <a:p>
             <a:fld id="{EE03B5A0-15F8-4C99-AFC1-956F43C85EF9}" type="datetimeFigureOut">
               <a:rPr lang="en-US" smtClean="0"/>
-              <a:t>1/26/2024</a:t>
+              <a:t>1/27/2024</a:t>
             </a:fld>
             <a:endParaRPr lang="en-US"/>
           </a:p>
@@ -4824,7 +4830,7 @@
           <a:p>
             <a:fld id="{EE03B5A0-15F8-4C99-AFC1-956F43C85EF9}" type="datetimeFigureOut">
               <a:rPr lang="en-US" smtClean="0"/>
-              <a:t>1/26/2024</a:t>
+              <a:t>1/27/2024</a:t>
             </a:fld>
             <a:endParaRPr lang="en-US"/>
           </a:p>
@@ -5124,7 +5130,7 @@
           <a:p>
             <a:fld id="{EE03B5A0-15F8-4C99-AFC1-956F43C85EF9}" type="datetimeFigureOut">
               <a:rPr lang="en-US" smtClean="0"/>
-              <a:t>1/26/2024</a:t>
+              <a:t>1/27/2024</a:t>
             </a:fld>
             <a:endParaRPr lang="en-US"/>
           </a:p>
@@ -5358,7 +5364,7 @@
           <a:p>
             <a:fld id="{EE03B5A0-15F8-4C99-AFC1-956F43C85EF9}" type="datetimeFigureOut">
               <a:rPr lang="en-US" smtClean="0"/>
-              <a:t>1/26/2024</a:t>
+              <a:t>1/27/2024</a:t>
             </a:fld>
             <a:endParaRPr lang="en-US"/>
           </a:p>
@@ -7213,333 +7219,187 @@
           <a:chExt cx="0" cy="0"/>
         </a:xfrm>
       </p:grpSpPr>
-      <p:sp useBgFill="1">
-        <p:nvSpPr>
-          <p:cNvPr id="8" name="Rectangle 7">
+      <p:sp>
+        <p:nvSpPr>
+          <p:cNvPr id="2" name="Nadpis 1">
             <a:extLst>
               <a:ext uri="{FF2B5EF4-FFF2-40B4-BE49-F238E27FC236}">
-                <a16:creationId xmlns:a16="http://schemas.microsoft.com/office/drawing/2014/main" id="{9A6C2C86-63BF-47D5-AA3F-905111A238E2}"/>
-              </a:ext>
-              <a:ext uri="{C183D7F6-B498-43B3-948B-1728B52AA6E4}">
-                <adec:decorative xmlns:adec="http://schemas.microsoft.com/office/drawing/2017/decorative" val="1"/>
+                <a16:creationId xmlns:a16="http://schemas.microsoft.com/office/drawing/2014/main" id="{E8CE3F34-8ACE-B576-4DA6-D150B0D86FEA}"/>
               </a:ext>
             </a:extLst>
           </p:cNvPr>
           <p:cNvSpPr>
-            <a:spLocks noGrp="1" noRot="1" noChangeAspect="1" noMove="1" noResize="1" noEditPoints="1" noAdjustHandles="1" noChangeArrowheads="1" noChangeShapeType="1" noTextEdit="1"/>
-          </p:cNvSpPr>
-          <p:nvPr>
-            <p:extLst>
-              <p:ext uri="{386F3935-93C4-4BCD-93E2-E3B085C9AB24}">
-                <p16:designElem xmlns:p16="http://schemas.microsoft.com/office/powerpoint/2015/main" val="1"/>
-              </p:ext>
-            </p:extLst>
+            <a:spLocks noGrp="1"/>
+          </p:cNvSpPr>
+          <p:nvPr>
+            <p:ph type="title"/>
           </p:nvPr>
         </p:nvSpPr>
         <p:spPr>
           <a:xfrm>
-            <a:off x="0" y="0"/>
-            <a:ext cx="12192000" cy="6858000"/>
+            <a:off x="707900" y="643467"/>
+            <a:ext cx="3946393" cy="1956298"/>
+          </a:xfrm>
+        </p:spPr>
+        <p:txBody>
+          <a:bodyPr>
+            <a:normAutofit/>
+          </a:bodyPr>
+          <a:lstStyle/>
+          <a:p>
+            <a:pPr algn="l"/>
+            <a:r>
+              <a:rPr lang="cs-CZ" sz="3600" dirty="0">
+                <a:latin typeface="Rockwell Nova" panose="02060503020205020403" pitchFamily="18" charset="0"/>
+              </a:rPr>
+              <a:t>Responzivní design s Media </a:t>
+            </a:r>
+            <a:r>
+              <a:rPr lang="cs-CZ" sz="3600" dirty="0" err="1">
+                <a:latin typeface="Rockwell Nova" panose="02060503020205020403" pitchFamily="18" charset="0"/>
+              </a:rPr>
+              <a:t>Query</a:t>
+            </a:r>
+            <a:endParaRPr lang="en-US" sz="3600" dirty="0">
+              <a:latin typeface="Rockwell Nova" panose="02060503020205020403" pitchFamily="18" charset="0"/>
+            </a:endParaRPr>
+          </a:p>
+        </p:txBody>
+      </p:sp>
+      <p:sp>
+        <p:nvSpPr>
+          <p:cNvPr id="3" name="Zástupný obsah 2">
+            <a:extLst>
+              <a:ext uri="{FF2B5EF4-FFF2-40B4-BE49-F238E27FC236}">
+                <a16:creationId xmlns:a16="http://schemas.microsoft.com/office/drawing/2014/main" id="{1E1DAC2A-54D5-8BC3-407E-E19EA2BAB9B2}"/>
+              </a:ext>
+            </a:extLst>
+          </p:cNvPr>
+          <p:cNvSpPr>
+            <a:spLocks noGrp="1"/>
+          </p:cNvSpPr>
+          <p:nvPr>
+            <p:ph idx="1"/>
+          </p:nvPr>
+        </p:nvSpPr>
+        <p:spPr>
+          <a:xfrm>
+            <a:off x="5139768" y="643467"/>
+            <a:ext cx="6430560" cy="2711378"/>
+          </a:xfrm>
+        </p:spPr>
+        <p:txBody>
+          <a:bodyPr anchor="ctr">
+            <a:normAutofit lnSpcReduction="10000"/>
+          </a:bodyPr>
+          <a:lstStyle/>
+          <a:p>
+            <a:pPr>
+              <a:lnSpc>
+                <a:spcPct val="90000"/>
+              </a:lnSpc>
+              <a:buClr>
+                <a:srgbClr val="FFAC47"/>
+              </a:buClr>
+            </a:pPr>
+            <a:r>
+              <a:rPr lang="cs-CZ" sz="2400" dirty="0">
+                <a:latin typeface="Rockwell Nova" panose="02060503020205020403" pitchFamily="18" charset="0"/>
+              </a:rPr>
+              <a:t>Design, který reaguje na různé velikosti obrazovek a zařízení</a:t>
+            </a:r>
+          </a:p>
+          <a:p>
+            <a:pPr>
+              <a:lnSpc>
+                <a:spcPct val="90000"/>
+              </a:lnSpc>
+              <a:buClr>
+                <a:srgbClr val="FFAC47"/>
+              </a:buClr>
+            </a:pPr>
+            <a:r>
+              <a:rPr lang="cs-CZ" sz="2400" dirty="0">
+                <a:latin typeface="Rockwell Nova" panose="02060503020205020403" pitchFamily="18" charset="0"/>
+              </a:rPr>
+              <a:t>Cíl je poskytnout optimální zkušenost uživatele na všech zařízeních</a:t>
+            </a:r>
+          </a:p>
+          <a:p>
+            <a:pPr>
+              <a:lnSpc>
+                <a:spcPct val="90000"/>
+              </a:lnSpc>
+              <a:buClr>
+                <a:srgbClr val="FFAC47"/>
+              </a:buClr>
+            </a:pPr>
+            <a:r>
+              <a:rPr lang="cs-CZ" sz="2400" dirty="0">
+                <a:latin typeface="Rockwell Nova" panose="02060503020205020403" pitchFamily="18" charset="0"/>
+              </a:rPr>
+              <a:t>Důvody</a:t>
+            </a:r>
+            <a:r>
+              <a:rPr lang="cs-CZ" sz="2400" b="1" dirty="0">
+                <a:latin typeface="Rockwell Nova" panose="02060503020205020403" pitchFamily="18" charset="0"/>
+              </a:rPr>
+              <a:t>: </a:t>
+            </a:r>
+            <a:r>
+              <a:rPr lang="cs-CZ" sz="2400" dirty="0">
+                <a:latin typeface="Rockwell Nova" panose="02060503020205020403" pitchFamily="18" charset="0"/>
+              </a:rPr>
+              <a:t>Poskytuje konzistentní vzhled, zvyšuje přístupnost pro uživatele</a:t>
+            </a:r>
+          </a:p>
+          <a:p>
+            <a:pPr>
+              <a:lnSpc>
+                <a:spcPct val="90000"/>
+              </a:lnSpc>
+              <a:buClr>
+                <a:srgbClr val="FFAC47"/>
+              </a:buClr>
+            </a:pPr>
+            <a:endParaRPr lang="en-US" sz="1700" dirty="0"/>
+          </a:p>
+        </p:txBody>
+      </p:sp>
+      <p:pic>
+        <p:nvPicPr>
+          <p:cNvPr id="5" name="Obrázek 4">
+            <a:extLst>
+              <a:ext uri="{FF2B5EF4-FFF2-40B4-BE49-F238E27FC236}">
+                <a16:creationId xmlns:a16="http://schemas.microsoft.com/office/drawing/2014/main" id="{032871AB-383A-B020-DB53-36CDC066DEED}"/>
+              </a:ext>
+            </a:extLst>
+          </p:cNvPr>
+          <p:cNvPicPr>
+            <a:picLocks noChangeAspect="1"/>
+          </p:cNvPicPr>
+          <p:nvPr/>
+        </p:nvPicPr>
+        <p:blipFill>
+          <a:blip r:embed="rId3"/>
+          <a:stretch>
+            <a:fillRect/>
+          </a:stretch>
+        </p:blipFill>
+        <p:spPr>
+          <a:xfrm>
+            <a:off x="643468" y="3150570"/>
+            <a:ext cx="10926860" cy="2711379"/>
           </a:xfrm>
           <a:prstGeom prst="rect">
             <a:avLst/>
           </a:prstGeom>
-          <a:ln>
-            <a:noFill/>
-          </a:ln>
         </p:spPr>
-        <p:style>
-          <a:lnRef idx="2">
-            <a:schemeClr val="accent1">
-              <a:shade val="50000"/>
-            </a:schemeClr>
-          </a:lnRef>
-          <a:fillRef idx="1">
-            <a:schemeClr val="accent1"/>
-          </a:fillRef>
-          <a:effectRef idx="0">
-            <a:schemeClr val="accent1"/>
-          </a:effectRef>
-          <a:fontRef idx="minor">
-            <a:schemeClr val="lt1"/>
-          </a:fontRef>
-        </p:style>
-        <p:txBody>
-          <a:bodyPr rtlCol="0" anchor="ctr"/>
-          <a:lstStyle/>
-          <a:p>
-            <a:pPr algn="ctr"/>
-            <a:endParaRPr lang="en-US"/>
-          </a:p>
-        </p:txBody>
-      </p:sp>
-      <p:sp>
-        <p:nvSpPr>
-          <p:cNvPr id="2" name="Nadpis 1">
-            <a:extLst>
-              <a:ext uri="{FF2B5EF4-FFF2-40B4-BE49-F238E27FC236}">
-                <a16:creationId xmlns:a16="http://schemas.microsoft.com/office/drawing/2014/main" id="{483313DA-9A7C-8865-2F11-113FE31B30CE}"/>
-              </a:ext>
-            </a:extLst>
-          </p:cNvPr>
-          <p:cNvSpPr>
-            <a:spLocks noGrp="1"/>
-          </p:cNvSpPr>
-          <p:nvPr>
-            <p:ph type="title"/>
-          </p:nvPr>
-        </p:nvSpPr>
-        <p:spPr>
-          <a:xfrm>
-            <a:off x="834013" y="1115568"/>
-            <a:ext cx="3487616" cy="4626864"/>
-          </a:xfrm>
-        </p:spPr>
-        <p:txBody>
-          <a:bodyPr>
-            <a:normAutofit/>
-          </a:bodyPr>
-          <a:lstStyle/>
-          <a:p>
-            <a:pPr algn="l"/>
-            <a:r>
-              <a:rPr lang="cs-CZ" sz="3600" dirty="0">
-                <a:latin typeface="Rockwell Nova" panose="02060503020205020403" pitchFamily="18" charset="0"/>
-              </a:rPr>
-              <a:t>JavaScript</a:t>
-            </a:r>
-            <a:endParaRPr lang="en-US" sz="3600" dirty="0">
-              <a:latin typeface="Rockwell Nova" panose="02060503020205020403" pitchFamily="18" charset="0"/>
-            </a:endParaRPr>
-          </a:p>
-        </p:txBody>
-      </p:sp>
-      <p:cxnSp>
-        <p:nvCxnSpPr>
-          <p:cNvPr id="10" name="Straight Connector 9">
-            <a:extLst>
-              <a:ext uri="{FF2B5EF4-FFF2-40B4-BE49-F238E27FC236}">
-                <a16:creationId xmlns:a16="http://schemas.microsoft.com/office/drawing/2014/main" id="{425A0768-3044-4AA9-A889-D2CAA68C517A}"/>
-              </a:ext>
-              <a:ext uri="{C183D7F6-B498-43B3-948B-1728B52AA6E4}">
-                <adec:decorative xmlns:adec="http://schemas.microsoft.com/office/drawing/2017/decorative" val="1"/>
-              </a:ext>
-            </a:extLst>
-          </p:cNvPr>
-          <p:cNvCxnSpPr>
-            <a:cxnSpLocks noGrp="1" noRot="1" noChangeAspect="1" noMove="1" noResize="1" noEditPoints="1" noAdjustHandles="1" noChangeArrowheads="1" noChangeShapeType="1"/>
-          </p:cNvCxnSpPr>
-          <p:nvPr>
-            <p:extLst>
-              <p:ext uri="{386F3935-93C4-4BCD-93E2-E3B085C9AB24}">
-                <p16:designElem xmlns:p16="http://schemas.microsoft.com/office/powerpoint/2015/main" val="1"/>
-              </p:ext>
-            </p:extLst>
-          </p:nvPr>
-        </p:nvCxnSpPr>
-        <p:spPr>
-          <a:xfrm>
-            <a:off x="4654605" y="2057400"/>
-            <a:ext cx="0" cy="2743200"/>
-          </a:xfrm>
-          <a:prstGeom prst="line">
-            <a:avLst/>
-          </a:prstGeom>
-          <a:ln w="19050">
-            <a:solidFill>
-              <a:schemeClr val="tx2"/>
-            </a:solidFill>
-          </a:ln>
-        </p:spPr>
-        <p:style>
-          <a:lnRef idx="1">
-            <a:schemeClr val="accent1"/>
-          </a:lnRef>
-          <a:fillRef idx="0">
-            <a:schemeClr val="accent1"/>
-          </a:fillRef>
-          <a:effectRef idx="0">
-            <a:schemeClr val="accent1"/>
-          </a:effectRef>
-          <a:fontRef idx="minor">
-            <a:schemeClr val="tx1"/>
-          </a:fontRef>
-        </p:style>
-      </p:cxnSp>
-      <p:sp>
-        <p:nvSpPr>
-          <p:cNvPr id="3" name="Zástupný obsah 2">
-            <a:extLst>
-              <a:ext uri="{FF2B5EF4-FFF2-40B4-BE49-F238E27FC236}">
-                <a16:creationId xmlns:a16="http://schemas.microsoft.com/office/drawing/2014/main" id="{7CD64CB9-A6B9-C715-7721-8BEB6D2AAD8A}"/>
-              </a:ext>
-            </a:extLst>
-          </p:cNvPr>
-          <p:cNvSpPr>
-            <a:spLocks noGrp="1"/>
-          </p:cNvSpPr>
-          <p:nvPr>
-            <p:ph idx="1"/>
-          </p:nvPr>
-        </p:nvSpPr>
-        <p:spPr>
-          <a:xfrm>
-            <a:off x="5105398" y="1115568"/>
-            <a:ext cx="6245352" cy="4626864"/>
-          </a:xfrm>
-        </p:spPr>
-        <p:txBody>
-          <a:bodyPr anchor="ctr">
-            <a:normAutofit/>
-          </a:bodyPr>
-          <a:lstStyle/>
-          <a:p>
-            <a:r>
-              <a:rPr lang="cs-CZ" dirty="0">
-                <a:latin typeface="Rockwell Nova" panose="02060503020205020403" pitchFamily="18" charset="0"/>
-              </a:rPr>
-              <a:t>Skriptovací jazyk pro interaktivitu na webových stránkách</a:t>
-            </a:r>
-          </a:p>
-          <a:p>
-            <a:r>
-              <a:rPr lang="cs-CZ" dirty="0">
-                <a:latin typeface="Rockwell Nova" panose="02060503020205020403" pitchFamily="18" charset="0"/>
-              </a:rPr>
-              <a:t>Běží v prohlížeči klienta</a:t>
-            </a:r>
-          </a:p>
-          <a:p>
-            <a:r>
-              <a:rPr lang="en-US" dirty="0" err="1">
-                <a:latin typeface="Rockwell Nova" panose="02060503020205020403" pitchFamily="18" charset="0"/>
-              </a:rPr>
-              <a:t>Umístěn</a:t>
-            </a:r>
-            <a:r>
-              <a:rPr lang="en-US" dirty="0">
-                <a:latin typeface="Rockwell Nova" panose="02060503020205020403" pitchFamily="18" charset="0"/>
-              </a:rPr>
-              <a:t> </a:t>
-            </a:r>
-            <a:r>
-              <a:rPr lang="en-US" dirty="0" err="1">
-                <a:latin typeface="Rockwell Nova" panose="02060503020205020403" pitchFamily="18" charset="0"/>
-              </a:rPr>
-              <a:t>ve</a:t>
-            </a:r>
-            <a:r>
-              <a:rPr lang="en-US" dirty="0">
-                <a:latin typeface="Rockwell Nova" panose="02060503020205020403" pitchFamily="18" charset="0"/>
-              </a:rPr>
-              <a:t> </a:t>
-            </a:r>
-            <a:r>
-              <a:rPr lang="en-US" dirty="0" err="1">
-                <a:latin typeface="Rockwell Nova" panose="02060503020205020403" pitchFamily="18" charset="0"/>
-              </a:rPr>
-              <a:t>vedlejších</a:t>
-            </a:r>
-            <a:r>
-              <a:rPr lang="en-US" dirty="0">
-                <a:latin typeface="Rockwell Nova" panose="02060503020205020403" pitchFamily="18" charset="0"/>
-              </a:rPr>
-              <a:t> </a:t>
-            </a:r>
-            <a:r>
-              <a:rPr lang="en-US" dirty="0" err="1">
-                <a:latin typeface="Rockwell Nova" panose="02060503020205020403" pitchFamily="18" charset="0"/>
-              </a:rPr>
-              <a:t>souborech</a:t>
-            </a:r>
-            <a:r>
-              <a:rPr lang="en-US" dirty="0">
-                <a:latin typeface="Rockwell Nova" panose="02060503020205020403" pitchFamily="18" charset="0"/>
-              </a:rPr>
-              <a:t> </a:t>
-            </a:r>
-            <a:r>
-              <a:rPr lang="en-US" dirty="0" err="1">
-                <a:latin typeface="Rockwell Nova" panose="02060503020205020403" pitchFamily="18" charset="0"/>
-              </a:rPr>
-              <a:t>nebo</a:t>
-            </a:r>
-            <a:r>
-              <a:rPr lang="en-US" dirty="0">
-                <a:latin typeface="Rockwell Nova" panose="02060503020205020403" pitchFamily="18" charset="0"/>
-              </a:rPr>
-              <a:t> </a:t>
-            </a:r>
-            <a:r>
-              <a:rPr lang="en-US" dirty="0" err="1">
-                <a:latin typeface="Rockwell Nova" panose="02060503020205020403" pitchFamily="18" charset="0"/>
-              </a:rPr>
-              <a:t>přímo</a:t>
-            </a:r>
-            <a:r>
-              <a:rPr lang="en-US" dirty="0">
-                <a:latin typeface="Rockwell Nova" panose="02060503020205020403" pitchFamily="18" charset="0"/>
-              </a:rPr>
-              <a:t> </a:t>
-            </a:r>
-            <a:r>
-              <a:rPr lang="en-US" dirty="0" err="1">
-                <a:latin typeface="Rockwell Nova" panose="02060503020205020403" pitchFamily="18" charset="0"/>
-              </a:rPr>
-              <a:t>vložen</a:t>
-            </a:r>
-            <a:r>
-              <a:rPr lang="en-US" dirty="0">
-                <a:latin typeface="Rockwell Nova" panose="02060503020205020403" pitchFamily="18" charset="0"/>
-              </a:rPr>
-              <a:t> v HTML </a:t>
-            </a:r>
-            <a:r>
-              <a:rPr lang="en-US" dirty="0" err="1">
-                <a:latin typeface="Rockwell Nova" panose="02060503020205020403" pitchFamily="18" charset="0"/>
-              </a:rPr>
-              <a:t>pomocí</a:t>
-            </a:r>
-            <a:r>
-              <a:rPr lang="en-US" dirty="0">
-                <a:latin typeface="Rockwell Nova" panose="02060503020205020403" pitchFamily="18" charset="0"/>
-              </a:rPr>
-              <a:t> </a:t>
-            </a:r>
-            <a:r>
-              <a:rPr lang="en-US" dirty="0" err="1">
-                <a:latin typeface="Rockwell Nova" panose="02060503020205020403" pitchFamily="18" charset="0"/>
-              </a:rPr>
-              <a:t>značky</a:t>
-            </a:r>
-            <a:r>
-              <a:rPr lang="en-US" dirty="0">
-                <a:latin typeface="Rockwell Nova" panose="02060503020205020403" pitchFamily="18" charset="0"/>
-              </a:rPr>
-              <a:t> &lt;</a:t>
-            </a:r>
-            <a:r>
-              <a:rPr lang="cs-CZ" dirty="0">
-                <a:latin typeface="Rockwell Nova" panose="02060503020205020403" pitchFamily="18" charset="0"/>
-              </a:rPr>
-              <a:t>script</a:t>
-            </a:r>
-            <a:r>
-              <a:rPr lang="en-US" dirty="0">
-                <a:latin typeface="Rockwell Nova" panose="02060503020205020403" pitchFamily="18" charset="0"/>
-              </a:rPr>
-              <a:t>&gt;</a:t>
-            </a:r>
-          </a:p>
-          <a:p>
-            <a:endParaRPr lang="en-US" dirty="0"/>
-          </a:p>
-        </p:txBody>
-      </p:sp>
+      </p:pic>
     </p:spTree>
     <p:extLst>
       <p:ext uri="{BB962C8B-B14F-4D97-AF65-F5344CB8AC3E}">
-        <p14:creationId xmlns:p14="http://schemas.microsoft.com/office/powerpoint/2010/main" val="1809372569"/>
+        <p14:creationId xmlns:p14="http://schemas.microsoft.com/office/powerpoint/2010/main" val="3272577122"/>
       </p:ext>
     </p:extLst>
   </p:cSld>
@@ -7585,6 +7445,378 @@
           <a:chExt cx="0" cy="0"/>
         </a:xfrm>
       </p:grpSpPr>
+      <p:sp useBgFill="1">
+        <p:nvSpPr>
+          <p:cNvPr id="8" name="Rectangle 7">
+            <a:extLst>
+              <a:ext uri="{FF2B5EF4-FFF2-40B4-BE49-F238E27FC236}">
+                <a16:creationId xmlns:a16="http://schemas.microsoft.com/office/drawing/2014/main" id="{9A6C2C86-63BF-47D5-AA3F-905111A238E2}"/>
+              </a:ext>
+              <a:ext uri="{C183D7F6-B498-43B3-948B-1728B52AA6E4}">
+                <adec:decorative xmlns:adec="http://schemas.microsoft.com/office/drawing/2017/decorative" val="1"/>
+              </a:ext>
+            </a:extLst>
+          </p:cNvPr>
+          <p:cNvSpPr>
+            <a:spLocks noGrp="1" noRot="1" noChangeAspect="1" noMove="1" noResize="1" noEditPoints="1" noAdjustHandles="1" noChangeArrowheads="1" noChangeShapeType="1" noTextEdit="1"/>
+          </p:cNvSpPr>
+          <p:nvPr>
+            <p:extLst>
+              <p:ext uri="{386F3935-93C4-4BCD-93E2-E3B085C9AB24}">
+                <p16:designElem xmlns:p16="http://schemas.microsoft.com/office/powerpoint/2015/main" val="1"/>
+              </p:ext>
+            </p:extLst>
+          </p:nvPr>
+        </p:nvSpPr>
+        <p:spPr>
+          <a:xfrm>
+            <a:off x="0" y="0"/>
+            <a:ext cx="12192000" cy="6858000"/>
+          </a:xfrm>
+          <a:prstGeom prst="rect">
+            <a:avLst/>
+          </a:prstGeom>
+          <a:ln>
+            <a:noFill/>
+          </a:ln>
+        </p:spPr>
+        <p:style>
+          <a:lnRef idx="2">
+            <a:schemeClr val="accent1">
+              <a:shade val="50000"/>
+            </a:schemeClr>
+          </a:lnRef>
+          <a:fillRef idx="1">
+            <a:schemeClr val="accent1"/>
+          </a:fillRef>
+          <a:effectRef idx="0">
+            <a:schemeClr val="accent1"/>
+          </a:effectRef>
+          <a:fontRef idx="minor">
+            <a:schemeClr val="lt1"/>
+          </a:fontRef>
+        </p:style>
+        <p:txBody>
+          <a:bodyPr rtlCol="0" anchor="ctr"/>
+          <a:lstStyle/>
+          <a:p>
+            <a:pPr algn="ctr"/>
+            <a:endParaRPr lang="en-US"/>
+          </a:p>
+        </p:txBody>
+      </p:sp>
+      <p:sp>
+        <p:nvSpPr>
+          <p:cNvPr id="2" name="Nadpis 1">
+            <a:extLst>
+              <a:ext uri="{FF2B5EF4-FFF2-40B4-BE49-F238E27FC236}">
+                <a16:creationId xmlns:a16="http://schemas.microsoft.com/office/drawing/2014/main" id="{483313DA-9A7C-8865-2F11-113FE31B30CE}"/>
+              </a:ext>
+            </a:extLst>
+          </p:cNvPr>
+          <p:cNvSpPr>
+            <a:spLocks noGrp="1"/>
+          </p:cNvSpPr>
+          <p:nvPr>
+            <p:ph type="title"/>
+          </p:nvPr>
+        </p:nvSpPr>
+        <p:spPr>
+          <a:xfrm>
+            <a:off x="834013" y="1115568"/>
+            <a:ext cx="3487616" cy="4626864"/>
+          </a:xfrm>
+        </p:spPr>
+        <p:txBody>
+          <a:bodyPr>
+            <a:normAutofit/>
+          </a:bodyPr>
+          <a:lstStyle/>
+          <a:p>
+            <a:pPr algn="l"/>
+            <a:r>
+              <a:rPr lang="cs-CZ" sz="3600" dirty="0">
+                <a:latin typeface="Rockwell Nova" panose="02060503020205020403" pitchFamily="18" charset="0"/>
+              </a:rPr>
+              <a:t>JavaScript</a:t>
+            </a:r>
+            <a:endParaRPr lang="en-US" sz="3600" dirty="0">
+              <a:latin typeface="Rockwell Nova" panose="02060503020205020403" pitchFamily="18" charset="0"/>
+            </a:endParaRPr>
+          </a:p>
+        </p:txBody>
+      </p:sp>
+      <p:cxnSp>
+        <p:nvCxnSpPr>
+          <p:cNvPr id="10" name="Straight Connector 9">
+            <a:extLst>
+              <a:ext uri="{FF2B5EF4-FFF2-40B4-BE49-F238E27FC236}">
+                <a16:creationId xmlns:a16="http://schemas.microsoft.com/office/drawing/2014/main" id="{425A0768-3044-4AA9-A889-D2CAA68C517A}"/>
+              </a:ext>
+              <a:ext uri="{C183D7F6-B498-43B3-948B-1728B52AA6E4}">
+                <adec:decorative xmlns:adec="http://schemas.microsoft.com/office/drawing/2017/decorative" val="1"/>
+              </a:ext>
+            </a:extLst>
+          </p:cNvPr>
+          <p:cNvCxnSpPr>
+            <a:cxnSpLocks noGrp="1" noRot="1" noChangeAspect="1" noMove="1" noResize="1" noEditPoints="1" noAdjustHandles="1" noChangeArrowheads="1" noChangeShapeType="1"/>
+          </p:cNvCxnSpPr>
+          <p:nvPr>
+            <p:extLst>
+              <p:ext uri="{386F3935-93C4-4BCD-93E2-E3B085C9AB24}">
+                <p16:designElem xmlns:p16="http://schemas.microsoft.com/office/powerpoint/2015/main" val="1"/>
+              </p:ext>
+            </p:extLst>
+          </p:nvPr>
+        </p:nvCxnSpPr>
+        <p:spPr>
+          <a:xfrm>
+            <a:off x="4654605" y="2057400"/>
+            <a:ext cx="0" cy="2743200"/>
+          </a:xfrm>
+          <a:prstGeom prst="line">
+            <a:avLst/>
+          </a:prstGeom>
+          <a:ln w="19050">
+            <a:solidFill>
+              <a:schemeClr val="tx2"/>
+            </a:solidFill>
+          </a:ln>
+        </p:spPr>
+        <p:style>
+          <a:lnRef idx="1">
+            <a:schemeClr val="accent1"/>
+          </a:lnRef>
+          <a:fillRef idx="0">
+            <a:schemeClr val="accent1"/>
+          </a:fillRef>
+          <a:effectRef idx="0">
+            <a:schemeClr val="accent1"/>
+          </a:effectRef>
+          <a:fontRef idx="minor">
+            <a:schemeClr val="tx1"/>
+          </a:fontRef>
+        </p:style>
+      </p:cxnSp>
+      <p:sp>
+        <p:nvSpPr>
+          <p:cNvPr id="3" name="Zástupný obsah 2">
+            <a:extLst>
+              <a:ext uri="{FF2B5EF4-FFF2-40B4-BE49-F238E27FC236}">
+                <a16:creationId xmlns:a16="http://schemas.microsoft.com/office/drawing/2014/main" id="{7CD64CB9-A6B9-C715-7721-8BEB6D2AAD8A}"/>
+              </a:ext>
+            </a:extLst>
+          </p:cNvPr>
+          <p:cNvSpPr>
+            <a:spLocks noGrp="1"/>
+          </p:cNvSpPr>
+          <p:nvPr>
+            <p:ph idx="1"/>
+          </p:nvPr>
+        </p:nvSpPr>
+        <p:spPr>
+          <a:xfrm>
+            <a:off x="5105398" y="1115568"/>
+            <a:ext cx="6245352" cy="4626864"/>
+          </a:xfrm>
+        </p:spPr>
+        <p:txBody>
+          <a:bodyPr anchor="ctr">
+            <a:normAutofit/>
+          </a:bodyPr>
+          <a:lstStyle/>
+          <a:p>
+            <a:r>
+              <a:rPr lang="cs-CZ" dirty="0">
+                <a:latin typeface="Rockwell Nova" panose="02060503020205020403" pitchFamily="18" charset="0"/>
+              </a:rPr>
+              <a:t>Skriptovací jazyk pro interaktivitu na webových stránkách</a:t>
+            </a:r>
+          </a:p>
+          <a:p>
+            <a:r>
+              <a:rPr lang="cs-CZ" dirty="0">
+                <a:latin typeface="Rockwell Nova" panose="02060503020205020403" pitchFamily="18" charset="0"/>
+              </a:rPr>
+              <a:t>Běží v prohlížeči klienta</a:t>
+            </a:r>
+          </a:p>
+          <a:p>
+            <a:r>
+              <a:rPr lang="en-US" dirty="0" err="1">
+                <a:latin typeface="Rockwell Nova" panose="02060503020205020403" pitchFamily="18" charset="0"/>
+              </a:rPr>
+              <a:t>Umístěn</a:t>
+            </a:r>
+            <a:r>
+              <a:rPr lang="en-US" dirty="0">
+                <a:latin typeface="Rockwell Nova" panose="02060503020205020403" pitchFamily="18" charset="0"/>
+              </a:rPr>
+              <a:t> </a:t>
+            </a:r>
+            <a:r>
+              <a:rPr lang="en-US" dirty="0" err="1">
+                <a:latin typeface="Rockwell Nova" panose="02060503020205020403" pitchFamily="18" charset="0"/>
+              </a:rPr>
+              <a:t>ve</a:t>
+            </a:r>
+            <a:r>
+              <a:rPr lang="en-US" dirty="0">
+                <a:latin typeface="Rockwell Nova" panose="02060503020205020403" pitchFamily="18" charset="0"/>
+              </a:rPr>
+              <a:t> </a:t>
+            </a:r>
+            <a:r>
+              <a:rPr lang="en-US" dirty="0" err="1">
+                <a:latin typeface="Rockwell Nova" panose="02060503020205020403" pitchFamily="18" charset="0"/>
+              </a:rPr>
+              <a:t>vedlejších</a:t>
+            </a:r>
+            <a:r>
+              <a:rPr lang="en-US" dirty="0">
+                <a:latin typeface="Rockwell Nova" panose="02060503020205020403" pitchFamily="18" charset="0"/>
+              </a:rPr>
+              <a:t> </a:t>
+            </a:r>
+            <a:r>
+              <a:rPr lang="en-US" dirty="0" err="1">
+                <a:latin typeface="Rockwell Nova" panose="02060503020205020403" pitchFamily="18" charset="0"/>
+              </a:rPr>
+              <a:t>souborech</a:t>
+            </a:r>
+            <a:r>
+              <a:rPr lang="en-US" dirty="0">
+                <a:latin typeface="Rockwell Nova" panose="02060503020205020403" pitchFamily="18" charset="0"/>
+              </a:rPr>
+              <a:t> </a:t>
+            </a:r>
+            <a:r>
+              <a:rPr lang="en-US" dirty="0" err="1">
+                <a:latin typeface="Rockwell Nova" panose="02060503020205020403" pitchFamily="18" charset="0"/>
+              </a:rPr>
+              <a:t>nebo</a:t>
+            </a:r>
+            <a:r>
+              <a:rPr lang="en-US" dirty="0">
+                <a:latin typeface="Rockwell Nova" panose="02060503020205020403" pitchFamily="18" charset="0"/>
+              </a:rPr>
+              <a:t> </a:t>
+            </a:r>
+            <a:r>
+              <a:rPr lang="en-US" dirty="0" err="1">
+                <a:latin typeface="Rockwell Nova" panose="02060503020205020403" pitchFamily="18" charset="0"/>
+              </a:rPr>
+              <a:t>přímo</a:t>
+            </a:r>
+            <a:r>
+              <a:rPr lang="en-US" dirty="0">
+                <a:latin typeface="Rockwell Nova" panose="02060503020205020403" pitchFamily="18" charset="0"/>
+              </a:rPr>
+              <a:t> </a:t>
+            </a:r>
+            <a:r>
+              <a:rPr lang="en-US" dirty="0" err="1">
+                <a:latin typeface="Rockwell Nova" panose="02060503020205020403" pitchFamily="18" charset="0"/>
+              </a:rPr>
+              <a:t>vložen</a:t>
+            </a:r>
+            <a:r>
+              <a:rPr lang="en-US" dirty="0">
+                <a:latin typeface="Rockwell Nova" panose="02060503020205020403" pitchFamily="18" charset="0"/>
+              </a:rPr>
+              <a:t> v HTML </a:t>
+            </a:r>
+            <a:r>
+              <a:rPr lang="en-US" dirty="0" err="1">
+                <a:latin typeface="Rockwell Nova" panose="02060503020205020403" pitchFamily="18" charset="0"/>
+              </a:rPr>
+              <a:t>pomocí</a:t>
+            </a:r>
+            <a:r>
+              <a:rPr lang="en-US" dirty="0">
+                <a:latin typeface="Rockwell Nova" panose="02060503020205020403" pitchFamily="18" charset="0"/>
+              </a:rPr>
+              <a:t> </a:t>
+            </a:r>
+            <a:r>
+              <a:rPr lang="en-US" dirty="0" err="1">
+                <a:latin typeface="Rockwell Nova" panose="02060503020205020403" pitchFamily="18" charset="0"/>
+              </a:rPr>
+              <a:t>značky</a:t>
+            </a:r>
+            <a:r>
+              <a:rPr lang="en-US" dirty="0">
+                <a:latin typeface="Rockwell Nova" panose="02060503020205020403" pitchFamily="18" charset="0"/>
+              </a:rPr>
+              <a:t> &lt;</a:t>
+            </a:r>
+            <a:r>
+              <a:rPr lang="cs-CZ" dirty="0">
+                <a:latin typeface="Rockwell Nova" panose="02060503020205020403" pitchFamily="18" charset="0"/>
+              </a:rPr>
+              <a:t>script</a:t>
+            </a:r>
+            <a:r>
+              <a:rPr lang="en-US" dirty="0">
+                <a:latin typeface="Rockwell Nova" panose="02060503020205020403" pitchFamily="18" charset="0"/>
+              </a:rPr>
+              <a:t>&gt;</a:t>
+            </a:r>
+          </a:p>
+          <a:p>
+            <a:endParaRPr lang="en-US" dirty="0"/>
+          </a:p>
+        </p:txBody>
+      </p:sp>
+    </p:spTree>
+    <p:extLst>
+      <p:ext uri="{BB962C8B-B14F-4D97-AF65-F5344CB8AC3E}">
+        <p14:creationId xmlns:p14="http://schemas.microsoft.com/office/powerpoint/2010/main" val="1809372569"/>
+      </p:ext>
+    </p:extLst>
+  </p:cSld>
+  <p:clrMapOvr>
+    <a:masterClrMapping/>
+  </p:clrMapOvr>
+</p:sld>
+</file>
+
+<file path=ppt/slides/slide17.xml><?xml version="1.0" encoding="utf-8"?>
+<p:sld xmlns:a="http://schemas.openxmlformats.org/drawingml/2006/main" xmlns:r="http://schemas.openxmlformats.org/officeDocument/2006/relationships" xmlns:p="http://schemas.openxmlformats.org/presentationml/2006/main">
+  <p:cSld>
+    <p:bg>
+      <p:bgPr>
+        <a:blipFill rotWithShape="1">
+          <a:blip r:embed="rId2">
+            <a:duotone>
+              <a:schemeClr val="bg2">
+                <a:shade val="80000"/>
+                <a:lumMod val="80000"/>
+              </a:schemeClr>
+              <a:schemeClr val="bg2">
+                <a:tint val="98000"/>
+              </a:schemeClr>
+            </a:duotone>
+          </a:blip>
+          <a:stretch/>
+        </a:blipFill>
+        <a:effectLst/>
+      </p:bgPr>
+    </p:bg>
+    <p:spTree>
+      <p:nvGrpSpPr>
+        <p:cNvPr id="1" name=""/>
+        <p:cNvGrpSpPr/>
+        <p:nvPr/>
+      </p:nvGrpSpPr>
+      <p:grpSpPr>
+        <a:xfrm>
+          <a:off x="0" y="0"/>
+          <a:ext cx="0" cy="0"/>
+          <a:chOff x="0" y="0"/>
+          <a:chExt cx="0" cy="0"/>
+        </a:xfrm>
+      </p:grpSpPr>
       <p:sp>
         <p:nvSpPr>
           <p:cNvPr id="2" name="Nadpis 1">
@@ -7755,7 +7987,7 @@
 </p:sld>
 </file>
 
-<file path=ppt/slides/slide17.xml><?xml version="1.0" encoding="utf-8"?>
+<file path=ppt/slides/slide18.xml><?xml version="1.0" encoding="utf-8"?>
 <p:sld xmlns:a="http://schemas.openxmlformats.org/drawingml/2006/main" xmlns:r="http://schemas.openxmlformats.org/officeDocument/2006/relationships" xmlns:p="http://schemas.openxmlformats.org/presentationml/2006/main">
   <p:cSld>
     <p:spTree>
@@ -7964,7 +8196,7 @@
 </p:sld>
 </file>
 
-<file path=ppt/slides/slide18.xml><?xml version="1.0" encoding="utf-8"?>
+<file path=ppt/slides/slide19.xml><?xml version="1.0" encoding="utf-8"?>
 <p:sld xmlns:a="http://schemas.openxmlformats.org/drawingml/2006/main" xmlns:r="http://schemas.openxmlformats.org/officeDocument/2006/relationships" xmlns:p="http://schemas.openxmlformats.org/presentationml/2006/main">
   <p:cSld>
     <p:spTree>
@@ -8097,232 +8329,6 @@
 </p:sld>
 </file>
 
-<file path=ppt/slides/slide19.xml><?xml version="1.0" encoding="utf-8"?>
-<p:sld xmlns:a="http://schemas.openxmlformats.org/drawingml/2006/main" xmlns:r="http://schemas.openxmlformats.org/officeDocument/2006/relationships" xmlns:p="http://schemas.openxmlformats.org/presentationml/2006/main">
-  <p:cSld>
-    <p:bg>
-      <p:bgPr>
-        <a:blipFill rotWithShape="1">
-          <a:blip r:embed="rId2">
-            <a:duotone>
-              <a:schemeClr val="bg2">
-                <a:shade val="80000"/>
-                <a:lumMod val="80000"/>
-              </a:schemeClr>
-              <a:schemeClr val="bg2">
-                <a:tint val="98000"/>
-              </a:schemeClr>
-            </a:duotone>
-          </a:blip>
-          <a:stretch/>
-        </a:blipFill>
-        <a:effectLst/>
-      </p:bgPr>
-    </p:bg>
-    <p:spTree>
-      <p:nvGrpSpPr>
-        <p:cNvPr id="1" name=""/>
-        <p:cNvGrpSpPr/>
-        <p:nvPr/>
-      </p:nvGrpSpPr>
-      <p:grpSpPr>
-        <a:xfrm>
-          <a:off x="0" y="0"/>
-          <a:ext cx="0" cy="0"/>
-          <a:chOff x="0" y="0"/>
-          <a:chExt cx="0" cy="0"/>
-        </a:xfrm>
-      </p:grpSpPr>
-      <p:sp>
-        <p:nvSpPr>
-          <p:cNvPr id="2" name="Nadpis 1">
-            <a:extLst>
-              <a:ext uri="{FF2B5EF4-FFF2-40B4-BE49-F238E27FC236}">
-                <a16:creationId xmlns:a16="http://schemas.microsoft.com/office/drawing/2014/main" id="{E8CE3F34-8ACE-B576-4DA6-D150B0D86FEA}"/>
-              </a:ext>
-            </a:extLst>
-          </p:cNvPr>
-          <p:cNvSpPr>
-            <a:spLocks noGrp="1"/>
-          </p:cNvSpPr>
-          <p:nvPr>
-            <p:ph type="title"/>
-          </p:nvPr>
-        </p:nvSpPr>
-        <p:spPr>
-          <a:xfrm>
-            <a:off x="707900" y="643467"/>
-            <a:ext cx="3946393" cy="1956298"/>
-          </a:xfrm>
-        </p:spPr>
-        <p:txBody>
-          <a:bodyPr>
-            <a:normAutofit/>
-          </a:bodyPr>
-          <a:lstStyle/>
-          <a:p>
-            <a:pPr algn="l"/>
-            <a:r>
-              <a:rPr lang="cs-CZ" sz="3600" dirty="0">
-                <a:latin typeface="Rockwell Nova" panose="02060503020205020403" pitchFamily="18" charset="0"/>
-              </a:rPr>
-              <a:t>Responzivní design s Media </a:t>
-            </a:r>
-            <a:r>
-              <a:rPr lang="cs-CZ" sz="3600" dirty="0" err="1">
-                <a:latin typeface="Rockwell Nova" panose="02060503020205020403" pitchFamily="18" charset="0"/>
-              </a:rPr>
-              <a:t>Query</a:t>
-            </a:r>
-            <a:endParaRPr lang="en-US" sz="3600" dirty="0">
-              <a:latin typeface="Rockwell Nova" panose="02060503020205020403" pitchFamily="18" charset="0"/>
-            </a:endParaRPr>
-          </a:p>
-        </p:txBody>
-      </p:sp>
-      <p:sp>
-        <p:nvSpPr>
-          <p:cNvPr id="3" name="Zástupný obsah 2">
-            <a:extLst>
-              <a:ext uri="{FF2B5EF4-FFF2-40B4-BE49-F238E27FC236}">
-                <a16:creationId xmlns:a16="http://schemas.microsoft.com/office/drawing/2014/main" id="{1E1DAC2A-54D5-8BC3-407E-E19EA2BAB9B2}"/>
-              </a:ext>
-            </a:extLst>
-          </p:cNvPr>
-          <p:cNvSpPr>
-            <a:spLocks noGrp="1"/>
-          </p:cNvSpPr>
-          <p:nvPr>
-            <p:ph idx="1"/>
-          </p:nvPr>
-        </p:nvSpPr>
-        <p:spPr>
-          <a:xfrm>
-            <a:off x="5139768" y="643467"/>
-            <a:ext cx="6430560" cy="2711378"/>
-          </a:xfrm>
-        </p:spPr>
-        <p:txBody>
-          <a:bodyPr anchor="ctr">
-            <a:normAutofit lnSpcReduction="10000"/>
-          </a:bodyPr>
-          <a:lstStyle/>
-          <a:p>
-            <a:pPr>
-              <a:lnSpc>
-                <a:spcPct val="90000"/>
-              </a:lnSpc>
-              <a:buClr>
-                <a:srgbClr val="FFAC47"/>
-              </a:buClr>
-            </a:pPr>
-            <a:r>
-              <a:rPr lang="cs-CZ" sz="2400" dirty="0">
-                <a:latin typeface="Rockwell Nova" panose="02060503020205020403" pitchFamily="18" charset="0"/>
-              </a:rPr>
-              <a:t>Design, který reaguje na různé velikosti obrazovek a zařízení</a:t>
-            </a:r>
-          </a:p>
-          <a:p>
-            <a:pPr>
-              <a:lnSpc>
-                <a:spcPct val="90000"/>
-              </a:lnSpc>
-              <a:buClr>
-                <a:srgbClr val="FFAC47"/>
-              </a:buClr>
-            </a:pPr>
-            <a:r>
-              <a:rPr lang="cs-CZ" sz="2400" dirty="0">
-                <a:latin typeface="Rockwell Nova" panose="02060503020205020403" pitchFamily="18" charset="0"/>
-              </a:rPr>
-              <a:t>Cíl je poskytnout optimální zkušenost uživatele na všech zařízeních</a:t>
-            </a:r>
-          </a:p>
-          <a:p>
-            <a:pPr>
-              <a:lnSpc>
-                <a:spcPct val="90000"/>
-              </a:lnSpc>
-              <a:buClr>
-                <a:srgbClr val="FFAC47"/>
-              </a:buClr>
-            </a:pPr>
-            <a:r>
-              <a:rPr lang="cs-CZ" sz="2400" dirty="0">
-                <a:latin typeface="Rockwell Nova" panose="02060503020205020403" pitchFamily="18" charset="0"/>
-              </a:rPr>
-              <a:t>Důvody</a:t>
-            </a:r>
-            <a:r>
-              <a:rPr lang="cs-CZ" sz="2400" b="1" dirty="0">
-                <a:latin typeface="Rockwell Nova" panose="02060503020205020403" pitchFamily="18" charset="0"/>
-              </a:rPr>
-              <a:t>: </a:t>
-            </a:r>
-            <a:r>
-              <a:rPr lang="cs-CZ" sz="2400" dirty="0">
-                <a:latin typeface="Rockwell Nova" panose="02060503020205020403" pitchFamily="18" charset="0"/>
-              </a:rPr>
-              <a:t>Poskytuje konzistentní vzhled, zvyšuje přístupnost pro uživatele</a:t>
-            </a:r>
-          </a:p>
-          <a:p>
-            <a:pPr>
-              <a:lnSpc>
-                <a:spcPct val="90000"/>
-              </a:lnSpc>
-              <a:buClr>
-                <a:srgbClr val="FFAC47"/>
-              </a:buClr>
-            </a:pPr>
-            <a:endParaRPr lang="en-US" sz="1700" dirty="0"/>
-          </a:p>
-        </p:txBody>
-      </p:sp>
-      <p:pic>
-        <p:nvPicPr>
-          <p:cNvPr id="5" name="Obrázek 4">
-            <a:extLst>
-              <a:ext uri="{FF2B5EF4-FFF2-40B4-BE49-F238E27FC236}">
-                <a16:creationId xmlns:a16="http://schemas.microsoft.com/office/drawing/2014/main" id="{032871AB-383A-B020-DB53-36CDC066DEED}"/>
-              </a:ext>
-            </a:extLst>
-          </p:cNvPr>
-          <p:cNvPicPr>
-            <a:picLocks noChangeAspect="1"/>
-          </p:cNvPicPr>
-          <p:nvPr/>
-        </p:nvPicPr>
-        <p:blipFill>
-          <a:blip r:embed="rId3"/>
-          <a:stretch>
-            <a:fillRect/>
-          </a:stretch>
-        </p:blipFill>
-        <p:spPr>
-          <a:xfrm>
-            <a:off x="643468" y="3150570"/>
-            <a:ext cx="10926860" cy="2711379"/>
-          </a:xfrm>
-          <a:prstGeom prst="rect">
-            <a:avLst/>
-          </a:prstGeom>
-        </p:spPr>
-      </p:pic>
-    </p:spTree>
-    <p:extLst>
-      <p:ext uri="{BB962C8B-B14F-4D97-AF65-F5344CB8AC3E}">
-        <p14:creationId xmlns:p14="http://schemas.microsoft.com/office/powerpoint/2010/main" val="3272577122"/>
-      </p:ext>
-    </p:extLst>
-  </p:cSld>
-  <p:clrMapOvr>
-    <a:masterClrMapping/>
-  </p:clrMapOvr>
-</p:sld>
-</file>
-
 <file path=ppt/slides/slide2.xml><?xml version="1.0" encoding="utf-8"?>
 <p:sld xmlns:a="http://schemas.openxmlformats.org/drawingml/2006/main" xmlns:r="http://schemas.openxmlformats.org/officeDocument/2006/relationships" xmlns:p="http://schemas.openxmlformats.org/presentationml/2006/main">
   <p:cSld>
@@ -8560,13 +8566,13 @@
               <a:rPr lang="cs-CZ" sz="2400" dirty="0">
                 <a:latin typeface="Rockwell Nova" panose="02060503020205020403" pitchFamily="18" charset="0"/>
               </a:rPr>
-              <a:t>Interaktivita s </a:t>
+              <a:t>Responzivní design s Media </a:t>
             </a:r>
             <a:r>
               <a:rPr lang="cs-CZ" sz="2400" dirty="0" err="1">
                 <a:latin typeface="Rockwell Nova" panose="02060503020205020403" pitchFamily="18" charset="0"/>
               </a:rPr>
-              <a:t>JavaScriptem</a:t>
+              <a:t>Query</a:t>
             </a:r>
             <a:endParaRPr lang="cs-CZ" sz="2400" dirty="0">
               <a:latin typeface="Rockwell Nova" panose="02060503020205020403" pitchFamily="18" charset="0"/>
@@ -8577,28 +8583,25 @@
               <a:rPr lang="cs-CZ" sz="2400" dirty="0">
                 <a:latin typeface="Rockwell Nova" panose="02060503020205020403" pitchFamily="18" charset="0"/>
               </a:rPr>
-              <a:t>Písmo ve WWW</a:t>
-            </a:r>
-          </a:p>
-          <a:p>
-            <a:r>
-              <a:rPr lang="cs-CZ" sz="2400" dirty="0">
-                <a:latin typeface="Rockwell Nova" panose="02060503020205020403" pitchFamily="18" charset="0"/>
-              </a:rPr>
-              <a:t>Responzivní design s Media </a:t>
+              <a:t>Interaktivita s </a:t>
             </a:r>
             <a:r>
               <a:rPr lang="cs-CZ" sz="2400" dirty="0" err="1">
                 <a:latin typeface="Rockwell Nova" panose="02060503020205020403" pitchFamily="18" charset="0"/>
               </a:rPr>
-              <a:t>Query</a:t>
+              <a:t>JavaScriptem</a:t>
             </a:r>
             <a:endParaRPr lang="cs-CZ" sz="2400" dirty="0">
               <a:latin typeface="Rockwell Nova" panose="02060503020205020403" pitchFamily="18" charset="0"/>
             </a:endParaRPr>
           </a:p>
           <a:p>
-            <a:endParaRPr lang="en-US" dirty="0"/>
+            <a:r>
+              <a:rPr lang="cs-CZ" sz="2000" dirty="0">
+                <a:latin typeface="Rockwell Nova" panose="02060503020205020403" pitchFamily="18" charset="0"/>
+              </a:rPr>
+              <a:t>Písmo ve WWW</a:t>
+            </a:r>
           </a:p>
         </p:txBody>
       </p:sp>
@@ -8606,6 +8609,377 @@
     <p:extLst>
       <p:ext uri="{BB962C8B-B14F-4D97-AF65-F5344CB8AC3E}">
         <p14:creationId xmlns:p14="http://schemas.microsoft.com/office/powerpoint/2010/main" val="1384809627"/>
+      </p:ext>
+    </p:extLst>
+  </p:cSld>
+  <p:clrMapOvr>
+    <a:masterClrMapping/>
+  </p:clrMapOvr>
+</p:sld>
+</file>
+
+<file path=ppt/slides/slide20.xml><?xml version="1.0" encoding="utf-8"?>
+<p:sld xmlns:a="http://schemas.openxmlformats.org/drawingml/2006/main" xmlns:r="http://schemas.openxmlformats.org/officeDocument/2006/relationships" xmlns:p="http://schemas.openxmlformats.org/presentationml/2006/main">
+  <p:cSld>
+    <p:bg>
+      <p:bgPr>
+        <a:blipFill rotWithShape="1">
+          <a:blip r:embed="rId2">
+            <a:duotone>
+              <a:schemeClr val="bg2">
+                <a:shade val="80000"/>
+                <a:lumMod val="80000"/>
+              </a:schemeClr>
+              <a:schemeClr val="bg2">
+                <a:tint val="98000"/>
+              </a:schemeClr>
+            </a:duotone>
+          </a:blip>
+          <a:stretch/>
+        </a:blipFill>
+        <a:effectLst/>
+      </p:bgPr>
+    </p:bg>
+    <p:spTree>
+      <p:nvGrpSpPr>
+        <p:cNvPr id="1" name=""/>
+        <p:cNvGrpSpPr/>
+        <p:nvPr/>
+      </p:nvGrpSpPr>
+      <p:grpSpPr>
+        <a:xfrm>
+          <a:off x="0" y="0"/>
+          <a:ext cx="0" cy="0"/>
+          <a:chOff x="0" y="0"/>
+          <a:chExt cx="0" cy="0"/>
+        </a:xfrm>
+      </p:grpSpPr>
+      <p:sp useBgFill="1">
+        <p:nvSpPr>
+          <p:cNvPr id="8" name="Rectangle 7">
+            <a:extLst>
+              <a:ext uri="{FF2B5EF4-FFF2-40B4-BE49-F238E27FC236}">
+                <a16:creationId xmlns:a16="http://schemas.microsoft.com/office/drawing/2014/main" id="{9A6C2C86-63BF-47D5-AA3F-905111A238E2}"/>
+              </a:ext>
+              <a:ext uri="{C183D7F6-B498-43B3-948B-1728B52AA6E4}">
+                <adec:decorative xmlns:adec="http://schemas.microsoft.com/office/drawing/2017/decorative" val="1"/>
+              </a:ext>
+            </a:extLst>
+          </p:cNvPr>
+          <p:cNvSpPr>
+            <a:spLocks noGrp="1" noRot="1" noChangeAspect="1" noMove="1" noResize="1" noEditPoints="1" noAdjustHandles="1" noChangeArrowheads="1" noChangeShapeType="1" noTextEdit="1"/>
+          </p:cNvSpPr>
+          <p:nvPr>
+            <p:extLst>
+              <p:ext uri="{386F3935-93C4-4BCD-93E2-E3B085C9AB24}">
+                <p16:designElem xmlns:p16="http://schemas.microsoft.com/office/powerpoint/2015/main" val="1"/>
+              </p:ext>
+            </p:extLst>
+          </p:nvPr>
+        </p:nvSpPr>
+        <p:spPr>
+          <a:xfrm>
+            <a:off x="0" y="0"/>
+            <a:ext cx="12192000" cy="6858000"/>
+          </a:xfrm>
+          <a:prstGeom prst="rect">
+            <a:avLst/>
+          </a:prstGeom>
+          <a:ln>
+            <a:noFill/>
+          </a:ln>
+        </p:spPr>
+        <p:style>
+          <a:lnRef idx="2">
+            <a:schemeClr val="accent1">
+              <a:shade val="50000"/>
+            </a:schemeClr>
+          </a:lnRef>
+          <a:fillRef idx="1">
+            <a:schemeClr val="accent1"/>
+          </a:fillRef>
+          <a:effectRef idx="0">
+            <a:schemeClr val="accent1"/>
+          </a:effectRef>
+          <a:fontRef idx="minor">
+            <a:schemeClr val="lt1"/>
+          </a:fontRef>
+        </p:style>
+        <p:txBody>
+          <a:bodyPr rtlCol="0" anchor="ctr"/>
+          <a:lstStyle/>
+          <a:p>
+            <a:pPr algn="ctr"/>
+            <a:endParaRPr lang="en-US"/>
+          </a:p>
+        </p:txBody>
+      </p:sp>
+      <p:sp>
+        <p:nvSpPr>
+          <p:cNvPr id="2" name="Nadpis 1">
+            <a:extLst>
+              <a:ext uri="{FF2B5EF4-FFF2-40B4-BE49-F238E27FC236}">
+                <a16:creationId xmlns:a16="http://schemas.microsoft.com/office/drawing/2014/main" id="{483313DA-9A7C-8865-2F11-113FE31B30CE}"/>
+              </a:ext>
+            </a:extLst>
+          </p:cNvPr>
+          <p:cNvSpPr>
+            <a:spLocks noGrp="1"/>
+          </p:cNvSpPr>
+          <p:nvPr>
+            <p:ph type="title"/>
+          </p:nvPr>
+        </p:nvSpPr>
+        <p:spPr>
+          <a:xfrm>
+            <a:off x="678079" y="1115568"/>
+            <a:ext cx="3751130" cy="4626864"/>
+          </a:xfrm>
+        </p:spPr>
+        <p:txBody>
+          <a:bodyPr>
+            <a:normAutofit/>
+          </a:bodyPr>
+          <a:lstStyle/>
+          <a:p>
+            <a:r>
+              <a:rPr lang="cs-CZ" sz="3600" dirty="0">
+                <a:latin typeface="Rockwell Nova" panose="02060503020205020403" pitchFamily="18" charset="0"/>
+              </a:rPr>
+              <a:t>Písmo ve WWW</a:t>
+            </a:r>
+            <a:endParaRPr lang="en-US" sz="3600" dirty="0">
+              <a:latin typeface="Rockwell Nova" panose="02060503020205020403" pitchFamily="18" charset="0"/>
+            </a:endParaRPr>
+          </a:p>
+        </p:txBody>
+      </p:sp>
+      <p:cxnSp>
+        <p:nvCxnSpPr>
+          <p:cNvPr id="10" name="Straight Connector 9">
+            <a:extLst>
+              <a:ext uri="{FF2B5EF4-FFF2-40B4-BE49-F238E27FC236}">
+                <a16:creationId xmlns:a16="http://schemas.microsoft.com/office/drawing/2014/main" id="{425A0768-3044-4AA9-A889-D2CAA68C517A}"/>
+              </a:ext>
+              <a:ext uri="{C183D7F6-B498-43B3-948B-1728B52AA6E4}">
+                <adec:decorative xmlns:adec="http://schemas.microsoft.com/office/drawing/2017/decorative" val="1"/>
+              </a:ext>
+            </a:extLst>
+          </p:cNvPr>
+          <p:cNvCxnSpPr>
+            <a:cxnSpLocks noGrp="1" noRot="1" noChangeAspect="1" noMove="1" noResize="1" noEditPoints="1" noAdjustHandles="1" noChangeArrowheads="1" noChangeShapeType="1"/>
+          </p:cNvCxnSpPr>
+          <p:nvPr>
+            <p:extLst>
+              <p:ext uri="{386F3935-93C4-4BCD-93E2-E3B085C9AB24}">
+                <p16:designElem xmlns:p16="http://schemas.microsoft.com/office/powerpoint/2015/main" val="1"/>
+              </p:ext>
+            </p:extLst>
+          </p:nvPr>
+        </p:nvCxnSpPr>
+        <p:spPr>
+          <a:xfrm>
+            <a:off x="4654605" y="2057400"/>
+            <a:ext cx="0" cy="2743200"/>
+          </a:xfrm>
+          <a:prstGeom prst="line">
+            <a:avLst/>
+          </a:prstGeom>
+          <a:ln w="19050">
+            <a:solidFill>
+              <a:schemeClr val="tx2"/>
+            </a:solidFill>
+          </a:ln>
+        </p:spPr>
+        <p:style>
+          <a:lnRef idx="1">
+            <a:schemeClr val="accent1"/>
+          </a:lnRef>
+          <a:fillRef idx="0">
+            <a:schemeClr val="accent1"/>
+          </a:fillRef>
+          <a:effectRef idx="0">
+            <a:schemeClr val="accent1"/>
+          </a:effectRef>
+          <a:fontRef idx="minor">
+            <a:schemeClr val="tx1"/>
+          </a:fontRef>
+        </p:style>
+      </p:cxnSp>
+      <p:sp>
+        <p:nvSpPr>
+          <p:cNvPr id="3" name="Zástupný obsah 2">
+            <a:extLst>
+              <a:ext uri="{FF2B5EF4-FFF2-40B4-BE49-F238E27FC236}">
+                <a16:creationId xmlns:a16="http://schemas.microsoft.com/office/drawing/2014/main" id="{7CD64CB9-A6B9-C715-7721-8BEB6D2AAD8A}"/>
+              </a:ext>
+            </a:extLst>
+          </p:cNvPr>
+          <p:cNvSpPr>
+            <a:spLocks noGrp="1"/>
+          </p:cNvSpPr>
+          <p:nvPr>
+            <p:ph idx="1"/>
+          </p:nvPr>
+        </p:nvSpPr>
+        <p:spPr>
+          <a:xfrm>
+            <a:off x="5105398" y="1115568"/>
+            <a:ext cx="6245352" cy="4626864"/>
+          </a:xfrm>
+        </p:spPr>
+        <p:txBody>
+          <a:bodyPr anchor="ctr">
+            <a:normAutofit/>
+          </a:bodyPr>
+          <a:lstStyle/>
+          <a:p>
+            <a:r>
+              <a:rPr lang="cs-CZ" dirty="0">
+                <a:latin typeface="Rockwell Nova" panose="02060503020205020403" pitchFamily="18" charset="0"/>
+              </a:rPr>
+              <a:t>Skriptovací jazyk pro interaktivitu na webových stránkách</a:t>
+            </a:r>
+          </a:p>
+          <a:p>
+            <a:r>
+              <a:rPr lang="cs-CZ" dirty="0">
+                <a:latin typeface="Rockwell Nova" panose="02060503020205020403" pitchFamily="18" charset="0"/>
+              </a:rPr>
+              <a:t>Běží v prohlížeči klienta</a:t>
+            </a:r>
+          </a:p>
+          <a:p>
+            <a:r>
+              <a:rPr lang="en-US" dirty="0" err="1">
+                <a:latin typeface="Rockwell Nova" panose="02060503020205020403" pitchFamily="18" charset="0"/>
+              </a:rPr>
+              <a:t>Umístěn</a:t>
+            </a:r>
+            <a:r>
+              <a:rPr lang="en-US" dirty="0">
+                <a:latin typeface="Rockwell Nova" panose="02060503020205020403" pitchFamily="18" charset="0"/>
+              </a:rPr>
+              <a:t> </a:t>
+            </a:r>
+            <a:r>
+              <a:rPr lang="en-US" dirty="0" err="1">
+                <a:latin typeface="Rockwell Nova" panose="02060503020205020403" pitchFamily="18" charset="0"/>
+              </a:rPr>
+              <a:t>ve</a:t>
+            </a:r>
+            <a:r>
+              <a:rPr lang="en-US" dirty="0">
+                <a:latin typeface="Rockwell Nova" panose="02060503020205020403" pitchFamily="18" charset="0"/>
+              </a:rPr>
+              <a:t> </a:t>
+            </a:r>
+            <a:r>
+              <a:rPr lang="en-US" dirty="0" err="1">
+                <a:latin typeface="Rockwell Nova" panose="02060503020205020403" pitchFamily="18" charset="0"/>
+              </a:rPr>
+              <a:t>vedlejších</a:t>
+            </a:r>
+            <a:r>
+              <a:rPr lang="en-US" dirty="0">
+                <a:latin typeface="Rockwell Nova" panose="02060503020205020403" pitchFamily="18" charset="0"/>
+              </a:rPr>
+              <a:t> </a:t>
+            </a:r>
+            <a:r>
+              <a:rPr lang="en-US" dirty="0" err="1">
+                <a:latin typeface="Rockwell Nova" panose="02060503020205020403" pitchFamily="18" charset="0"/>
+              </a:rPr>
+              <a:t>souborech</a:t>
+            </a:r>
+            <a:r>
+              <a:rPr lang="en-US" dirty="0">
+                <a:latin typeface="Rockwell Nova" panose="02060503020205020403" pitchFamily="18" charset="0"/>
+              </a:rPr>
+              <a:t> </a:t>
+            </a:r>
+            <a:r>
+              <a:rPr lang="en-US" dirty="0" err="1">
+                <a:latin typeface="Rockwell Nova" panose="02060503020205020403" pitchFamily="18" charset="0"/>
+              </a:rPr>
+              <a:t>nebo</a:t>
+            </a:r>
+            <a:r>
+              <a:rPr lang="en-US" dirty="0">
+                <a:latin typeface="Rockwell Nova" panose="02060503020205020403" pitchFamily="18" charset="0"/>
+              </a:rPr>
+              <a:t> </a:t>
+            </a:r>
+            <a:r>
+              <a:rPr lang="en-US" dirty="0" err="1">
+                <a:latin typeface="Rockwell Nova" panose="02060503020205020403" pitchFamily="18" charset="0"/>
+              </a:rPr>
+              <a:t>přímo</a:t>
+            </a:r>
+            <a:r>
+              <a:rPr lang="en-US" dirty="0">
+                <a:latin typeface="Rockwell Nova" panose="02060503020205020403" pitchFamily="18" charset="0"/>
+              </a:rPr>
+              <a:t> </a:t>
+            </a:r>
+            <a:r>
+              <a:rPr lang="en-US" dirty="0" err="1">
+                <a:latin typeface="Rockwell Nova" panose="02060503020205020403" pitchFamily="18" charset="0"/>
+              </a:rPr>
+              <a:t>vložen</a:t>
+            </a:r>
+            <a:r>
+              <a:rPr lang="en-US" dirty="0">
+                <a:latin typeface="Rockwell Nova" panose="02060503020205020403" pitchFamily="18" charset="0"/>
+              </a:rPr>
+              <a:t> v HTML </a:t>
+            </a:r>
+            <a:r>
+              <a:rPr lang="en-US" dirty="0" err="1">
+                <a:latin typeface="Rockwell Nova" panose="02060503020205020403" pitchFamily="18" charset="0"/>
+              </a:rPr>
+              <a:t>pomocí</a:t>
+            </a:r>
+            <a:r>
+              <a:rPr lang="en-US" dirty="0">
+                <a:latin typeface="Rockwell Nova" panose="02060503020205020403" pitchFamily="18" charset="0"/>
+              </a:rPr>
+              <a:t> </a:t>
+            </a:r>
+            <a:r>
+              <a:rPr lang="en-US" dirty="0" err="1">
+                <a:latin typeface="Rockwell Nova" panose="02060503020205020403" pitchFamily="18" charset="0"/>
+              </a:rPr>
+              <a:t>značky</a:t>
+            </a:r>
+            <a:r>
+              <a:rPr lang="en-US" dirty="0">
+                <a:latin typeface="Rockwell Nova" panose="02060503020205020403" pitchFamily="18" charset="0"/>
+              </a:rPr>
+              <a:t> &lt;</a:t>
+            </a:r>
+            <a:r>
+              <a:rPr lang="cs-CZ" dirty="0">
+                <a:latin typeface="Rockwell Nova" panose="02060503020205020403" pitchFamily="18" charset="0"/>
+              </a:rPr>
+              <a:t>script</a:t>
+            </a:r>
+            <a:r>
+              <a:rPr lang="en-US" dirty="0">
+                <a:latin typeface="Rockwell Nova" panose="02060503020205020403" pitchFamily="18" charset="0"/>
+              </a:rPr>
+              <a:t>&gt;</a:t>
+            </a:r>
+          </a:p>
+          <a:p>
+            <a:endParaRPr lang="en-US" dirty="0"/>
+          </a:p>
+        </p:txBody>
+      </p:sp>
+    </p:spTree>
+    <p:extLst>
+      <p:ext uri="{BB962C8B-B14F-4D97-AF65-F5344CB8AC3E}">
+        <p14:creationId xmlns:p14="http://schemas.microsoft.com/office/powerpoint/2010/main" val="876299066"/>
       </p:ext>
     </p:extLst>
   </p:cSld>
@@ -9874,6 +10248,26 @@
               <a:rPr lang="cs-CZ" dirty="0">
                 <a:latin typeface="Rockwell Nova" panose="02060503020205020403" pitchFamily="18" charset="0"/>
               </a:rPr>
+              <a:t>&lt;</a:t>
+            </a:r>
+            <a:r>
+              <a:rPr lang="cs-CZ" dirty="0" err="1">
+                <a:latin typeface="Rockwell Nova" panose="02060503020205020403" pitchFamily="18" charset="0"/>
+              </a:rPr>
+              <a:t>img</a:t>
+            </a:r>
+            <a:r>
+              <a:rPr lang="cs-CZ" dirty="0">
+                <a:latin typeface="Rockwell Nova" panose="02060503020205020403" pitchFamily="18" charset="0"/>
+              </a:rPr>
+              <a:t>&gt;</a:t>
+            </a:r>
+          </a:p>
+          <a:p>
+            <a:r>
+              <a:rPr lang="cs-CZ" dirty="0">
+                <a:latin typeface="Rockwell Nova" panose="02060503020205020403" pitchFamily="18" charset="0"/>
+              </a:rPr>
               <a:t>&lt;audio&gt;</a:t>
             </a:r>
           </a:p>
@@ -10020,6 +10414,9 @@
             </a:r>
           </a:p>
           <a:p>
+            <a:pPr marL="36900" indent="0">
+              <a:buNone/>
+            </a:pPr>
             <a:endParaRPr lang="cs-CZ" dirty="0">
               <a:latin typeface="Rockwell Nova" panose="02060503020205020403" pitchFamily="18" charset="0"/>
             </a:endParaRPr>

</xml_diff>

<commit_message>
added end slides (need to pick one...)
</commit_message>
<xml_diff>
--- a/NavrhWEB.pptx
+++ b/NavrhWEB.pptx
@@ -20,11 +20,13 @@
     <p:sldId id="269" r:id="rId14"/>
     <p:sldId id="268" r:id="rId15"/>
     <p:sldId id="274" r:id="rId16"/>
-    <p:sldId id="270" r:id="rId17"/>
-    <p:sldId id="271" r:id="rId18"/>
-    <p:sldId id="272" r:id="rId19"/>
-    <p:sldId id="273" r:id="rId20"/>
-    <p:sldId id="275" r:id="rId21"/>
+    <p:sldId id="276" r:id="rId17"/>
+    <p:sldId id="270" r:id="rId18"/>
+    <p:sldId id="271" r:id="rId19"/>
+    <p:sldId id="272" r:id="rId20"/>
+    <p:sldId id="273" r:id="rId21"/>
+    <p:sldId id="277" r:id="rId22"/>
+    <p:sldId id="278" r:id="rId23"/>
   </p:sldIdLst>
   <p:sldSz cx="12192000" cy="6858000"/>
   <p:notesSz cx="6858000" cy="9144000"/>
@@ -6124,6 +6126,18 @@
   <p:clrMapOvr>
     <a:masterClrMapping/>
   </p:clrMapOvr>
+  <mc:AlternateContent xmlns:mc="http://schemas.openxmlformats.org/markup-compatibility/2006">
+    <mc:Choice xmlns:p14="http://schemas.microsoft.com/office/powerpoint/2010/main" Requires="p14">
+      <p:transition p14:dur="20">
+        <p:dissolve/>
+      </p:transition>
+    </mc:Choice>
+    <mc:Fallback>
+      <p:transition>
+        <p:dissolve/>
+      </p:transition>
+    </mc:Fallback>
+  </mc:AlternateContent>
 </p:sld>
 </file>
 
@@ -6327,6 +6341,18 @@
   <p:clrMapOvr>
     <a:masterClrMapping/>
   </p:clrMapOvr>
+  <mc:AlternateContent xmlns:mc="http://schemas.openxmlformats.org/markup-compatibility/2006">
+    <mc:Choice xmlns:p14="http://schemas.microsoft.com/office/powerpoint/2010/main" Requires="p14">
+      <p:transition p14:dur="50">
+        <p:dissolve/>
+      </p:transition>
+    </mc:Choice>
+    <mc:Fallback>
+      <p:transition>
+        <p:dissolve/>
+      </p:transition>
+    </mc:Fallback>
+  </mc:AlternateContent>
 </p:sld>
 </file>
 
@@ -6521,6 +6547,18 @@
   <p:clrMapOvr>
     <a:masterClrMapping/>
   </p:clrMapOvr>
+  <mc:AlternateContent xmlns:mc="http://schemas.openxmlformats.org/markup-compatibility/2006">
+    <mc:Choice xmlns:p14="http://schemas.microsoft.com/office/powerpoint/2010/main" Requires="p14">
+      <p:transition p14:dur="20">
+        <p:dissolve/>
+      </p:transition>
+    </mc:Choice>
+    <mc:Fallback>
+      <p:transition>
+        <p:dissolve/>
+      </p:transition>
+    </mc:Fallback>
+  </mc:AlternateContent>
 </p:sld>
 </file>
 
@@ -6794,6 +6832,18 @@
   <p:clrMapOvr>
     <a:masterClrMapping/>
   </p:clrMapOvr>
+  <mc:AlternateContent xmlns:mc="http://schemas.openxmlformats.org/markup-compatibility/2006">
+    <mc:Choice xmlns:p14="http://schemas.microsoft.com/office/powerpoint/2010/main" Requires="p14">
+      <p:transition p14:dur="20">
+        <p:dissolve/>
+      </p:transition>
+    </mc:Choice>
+    <mc:Fallback>
+      <p:transition>
+        <p:dissolve/>
+      </p:transition>
+    </mc:Fallback>
+  </mc:AlternateContent>
 </p:sld>
 </file>
 
@@ -6984,6 +7034,18 @@
   <p:clrMapOvr>
     <a:masterClrMapping/>
   </p:clrMapOvr>
+  <mc:AlternateContent xmlns:mc="http://schemas.openxmlformats.org/markup-compatibility/2006">
+    <mc:Choice xmlns:p14="http://schemas.microsoft.com/office/powerpoint/2010/main" Requires="p14">
+      <p:transition p14:dur="20">
+        <p:dissolve/>
+      </p:transition>
+    </mc:Choice>
+    <mc:Fallback>
+      <p:transition>
+        <p:dissolve/>
+      </p:transition>
+    </mc:Fallback>
+  </mc:AlternateContent>
 </p:sld>
 </file>
 
@@ -7180,6 +7242,18 @@
   <p:clrMapOvr>
     <a:masterClrMapping/>
   </p:clrMapOvr>
+  <mc:AlternateContent xmlns:mc="http://schemas.openxmlformats.org/markup-compatibility/2006">
+    <mc:Choice xmlns:p14="http://schemas.microsoft.com/office/powerpoint/2010/main" Requires="p14">
+      <p:transition p14:dur="20">
+        <p:dissolve/>
+      </p:transition>
+    </mc:Choice>
+    <mc:Fallback>
+      <p:transition>
+        <p:dissolve/>
+      </p:transition>
+    </mc:Fallback>
+  </mc:AlternateContent>
 </p:sld>
 </file>
 
@@ -7406,6 +7480,18 @@
   <p:clrMapOvr>
     <a:masterClrMapping/>
   </p:clrMapOvr>
+  <mc:AlternateContent xmlns:mc="http://schemas.openxmlformats.org/markup-compatibility/2006">
+    <mc:Choice xmlns:p14="http://schemas.microsoft.com/office/powerpoint/2010/main" Requires="p14">
+      <p:transition p14:dur="20">
+        <p:dissolve/>
+      </p:transition>
+    </mc:Choice>
+    <mc:Fallback>
+      <p:transition>
+        <p:dissolve/>
+      </p:transition>
+    </mc:Fallback>
+  </mc:AlternateContent>
 </p:sld>
 </file>
 
@@ -7445,6 +7531,189 @@
           <a:chExt cx="0" cy="0"/>
         </a:xfrm>
       </p:grpSpPr>
+      <p:sp>
+        <p:nvSpPr>
+          <p:cNvPr id="2" name="Nadpis 1">
+            <a:extLst>
+              <a:ext uri="{FF2B5EF4-FFF2-40B4-BE49-F238E27FC236}">
+                <a16:creationId xmlns:a16="http://schemas.microsoft.com/office/drawing/2014/main" id="{E8CE3F34-8ACE-B576-4DA6-D150B0D86FEA}"/>
+              </a:ext>
+            </a:extLst>
+          </p:cNvPr>
+          <p:cNvSpPr>
+            <a:spLocks noGrp="1"/>
+          </p:cNvSpPr>
+          <p:nvPr>
+            <p:ph type="title"/>
+          </p:nvPr>
+        </p:nvSpPr>
+        <p:spPr>
+          <a:xfrm>
+            <a:off x="707900" y="643467"/>
+            <a:ext cx="3946393" cy="1956298"/>
+          </a:xfrm>
+        </p:spPr>
+        <p:txBody>
+          <a:bodyPr>
+            <a:normAutofit/>
+          </a:bodyPr>
+          <a:lstStyle/>
+          <a:p>
+            <a:pPr algn="l"/>
+            <a:r>
+              <a:rPr lang="cs-CZ" sz="3600" dirty="0">
+                <a:latin typeface="Rockwell Nova" panose="02060503020205020403" pitchFamily="18" charset="0"/>
+              </a:rPr>
+              <a:t>Písmo ve WWW</a:t>
+            </a:r>
+            <a:endParaRPr lang="en-US" sz="3600" dirty="0">
+              <a:latin typeface="Rockwell Nova" panose="02060503020205020403" pitchFamily="18" charset="0"/>
+            </a:endParaRPr>
+          </a:p>
+        </p:txBody>
+      </p:sp>
+      <p:sp>
+        <p:nvSpPr>
+          <p:cNvPr id="3" name="Zástupný obsah 2">
+            <a:extLst>
+              <a:ext uri="{FF2B5EF4-FFF2-40B4-BE49-F238E27FC236}">
+                <a16:creationId xmlns:a16="http://schemas.microsoft.com/office/drawing/2014/main" id="{1E1DAC2A-54D5-8BC3-407E-E19EA2BAB9B2}"/>
+              </a:ext>
+            </a:extLst>
+          </p:cNvPr>
+          <p:cNvSpPr>
+            <a:spLocks noGrp="1"/>
+          </p:cNvSpPr>
+          <p:nvPr>
+            <p:ph idx="1"/>
+          </p:nvPr>
+        </p:nvSpPr>
+        <p:spPr>
+          <a:xfrm>
+            <a:off x="5139768" y="643467"/>
+            <a:ext cx="6430560" cy="2711378"/>
+          </a:xfrm>
+        </p:spPr>
+        <p:txBody>
+          <a:bodyPr anchor="ctr">
+            <a:normAutofit/>
+          </a:bodyPr>
+          <a:lstStyle/>
+          <a:p>
+            <a:pPr>
+              <a:lnSpc>
+                <a:spcPct val="90000"/>
+              </a:lnSpc>
+              <a:buClr>
+                <a:srgbClr val="FFAC47"/>
+              </a:buClr>
+            </a:pPr>
+            <a:r>
+              <a:rPr lang="cs-CZ" sz="2400" dirty="0">
+                <a:latin typeface="Rockwell Nova" panose="02060503020205020403" pitchFamily="18" charset="0"/>
+              </a:rPr>
+              <a:t>V CSS lze nastavit pro jednotlivé elementy font, jeho styl, tučnost a další parametry</a:t>
+            </a:r>
+          </a:p>
+        </p:txBody>
+      </p:sp>
+      <p:pic>
+        <p:nvPicPr>
+          <p:cNvPr id="6" name="Obrázek 5" descr="Obsah obrázku text, snímek obrazovky, Písmo, řada/pruh&#10;&#10;Popis byl vytvořen automaticky">
+            <a:extLst>
+              <a:ext uri="{FF2B5EF4-FFF2-40B4-BE49-F238E27FC236}">
+                <a16:creationId xmlns:a16="http://schemas.microsoft.com/office/drawing/2014/main" id="{FD43B06F-8F74-3FA0-B086-A280FA55C7C1}"/>
+              </a:ext>
+            </a:extLst>
+          </p:cNvPr>
+          <p:cNvPicPr>
+            <a:picLocks noChangeAspect="1"/>
+          </p:cNvPicPr>
+          <p:nvPr/>
+        </p:nvPicPr>
+        <p:blipFill>
+          <a:blip r:embed="rId3">
+            <a:extLst>
+              <a:ext uri="{28A0092B-C50C-407E-A947-70E740481C1C}">
+                <a14:useLocalDpi xmlns:a14="http://schemas.microsoft.com/office/drawing/2010/main" val="0"/>
+              </a:ext>
+            </a:extLst>
+          </a:blip>
+          <a:stretch>
+            <a:fillRect/>
+          </a:stretch>
+        </p:blipFill>
+        <p:spPr>
+          <a:xfrm>
+            <a:off x="707900" y="2966055"/>
+            <a:ext cx="11098174" cy="3248478"/>
+          </a:xfrm>
+          <a:prstGeom prst="rect">
+            <a:avLst/>
+          </a:prstGeom>
+        </p:spPr>
+      </p:pic>
+    </p:spTree>
+    <p:extLst>
+      <p:ext uri="{BB962C8B-B14F-4D97-AF65-F5344CB8AC3E}">
+        <p14:creationId xmlns:p14="http://schemas.microsoft.com/office/powerpoint/2010/main" val="3096063090"/>
+      </p:ext>
+    </p:extLst>
+  </p:cSld>
+  <p:clrMapOvr>
+    <a:masterClrMapping/>
+  </p:clrMapOvr>
+  <mc:AlternateContent xmlns:mc="http://schemas.openxmlformats.org/markup-compatibility/2006">
+    <mc:Choice xmlns:p14="http://schemas.microsoft.com/office/powerpoint/2010/main" Requires="p14">
+      <p:transition p14:dur="20">
+        <p:dissolve/>
+      </p:transition>
+    </mc:Choice>
+    <mc:Fallback>
+      <p:transition>
+        <p:dissolve/>
+      </p:transition>
+    </mc:Fallback>
+  </mc:AlternateContent>
+</p:sld>
+</file>
+
+<file path=ppt/slides/slide17.xml><?xml version="1.0" encoding="utf-8"?>
+<p:sld xmlns:a="http://schemas.openxmlformats.org/drawingml/2006/main" xmlns:r="http://schemas.openxmlformats.org/officeDocument/2006/relationships" xmlns:p="http://schemas.openxmlformats.org/presentationml/2006/main">
+  <p:cSld>
+    <p:bg>
+      <p:bgPr>
+        <a:blipFill rotWithShape="1">
+          <a:blip r:embed="rId2">
+            <a:duotone>
+              <a:schemeClr val="bg2">
+                <a:shade val="80000"/>
+                <a:lumMod val="80000"/>
+              </a:schemeClr>
+              <a:schemeClr val="bg2">
+                <a:tint val="98000"/>
+              </a:schemeClr>
+            </a:duotone>
+          </a:blip>
+          <a:stretch/>
+        </a:blipFill>
+        <a:effectLst/>
+      </p:bgPr>
+    </p:bg>
+    <p:spTree>
+      <p:nvGrpSpPr>
+        <p:cNvPr id="1" name=""/>
+        <p:cNvGrpSpPr/>
+        <p:nvPr/>
+      </p:nvGrpSpPr>
+      <p:grpSpPr>
+        <a:xfrm>
+          <a:off x="0" y="0"/>
+          <a:ext cx="0" cy="0"/>
+          <a:chOff x="0" y="0"/>
+          <a:chExt cx="0" cy="0"/>
+        </a:xfrm>
+      </p:grpSpPr>
       <p:sp useBgFill="1">
         <p:nvSpPr>
           <p:cNvPr id="8" name="Rectangle 7">
@@ -7778,10 +8047,22 @@
   <p:clrMapOvr>
     <a:masterClrMapping/>
   </p:clrMapOvr>
+  <mc:AlternateContent xmlns:mc="http://schemas.openxmlformats.org/markup-compatibility/2006">
+    <mc:Choice xmlns:p14="http://schemas.microsoft.com/office/powerpoint/2010/main" Requires="p14">
+      <p:transition p14:dur="20">
+        <p:dissolve/>
+      </p:transition>
+    </mc:Choice>
+    <mc:Fallback>
+      <p:transition>
+        <p:dissolve/>
+      </p:transition>
+    </mc:Fallback>
+  </mc:AlternateContent>
 </p:sld>
 </file>
 
-<file path=ppt/slides/slide17.xml><?xml version="1.0" encoding="utf-8"?>
+<file path=ppt/slides/slide18.xml><?xml version="1.0" encoding="utf-8"?>
 <p:sld xmlns:a="http://schemas.openxmlformats.org/drawingml/2006/main" xmlns:r="http://schemas.openxmlformats.org/officeDocument/2006/relationships" xmlns:p="http://schemas.openxmlformats.org/presentationml/2006/main">
   <p:cSld>
     <p:bg>
@@ -7984,10 +8265,22 @@
   <p:clrMapOvr>
     <a:masterClrMapping/>
   </p:clrMapOvr>
+  <mc:AlternateContent xmlns:mc="http://schemas.openxmlformats.org/markup-compatibility/2006">
+    <mc:Choice xmlns:p14="http://schemas.microsoft.com/office/powerpoint/2010/main" Requires="p14">
+      <p:transition p14:dur="20">
+        <p:dissolve/>
+      </p:transition>
+    </mc:Choice>
+    <mc:Fallback>
+      <p:transition>
+        <p:dissolve/>
+      </p:transition>
+    </mc:Fallback>
+  </mc:AlternateContent>
 </p:sld>
 </file>
 
-<file path=ppt/slides/slide18.xml><?xml version="1.0" encoding="utf-8"?>
+<file path=ppt/slides/slide19.xml><?xml version="1.0" encoding="utf-8"?>
 <p:sld xmlns:a="http://schemas.openxmlformats.org/drawingml/2006/main" xmlns:r="http://schemas.openxmlformats.org/officeDocument/2006/relationships" xmlns:p="http://schemas.openxmlformats.org/presentationml/2006/main">
   <p:cSld>
     <p:spTree>
@@ -8193,10 +8486,323 @@
   <p:clrMapOvr>
     <a:masterClrMapping/>
   </p:clrMapOvr>
+  <mc:AlternateContent xmlns:mc="http://schemas.openxmlformats.org/markup-compatibility/2006">
+    <mc:Choice xmlns:p14="http://schemas.microsoft.com/office/powerpoint/2010/main" Requires="p14">
+      <p:transition p14:dur="20">
+        <p:dissolve/>
+      </p:transition>
+    </mc:Choice>
+    <mc:Fallback>
+      <p:transition>
+        <p:dissolve/>
+      </p:transition>
+    </mc:Fallback>
+  </mc:AlternateContent>
 </p:sld>
 </file>
 
-<file path=ppt/slides/slide19.xml><?xml version="1.0" encoding="utf-8"?>
+<file path=ppt/slides/slide2.xml><?xml version="1.0" encoding="utf-8"?>
+<p:sld xmlns:a="http://schemas.openxmlformats.org/drawingml/2006/main" xmlns:r="http://schemas.openxmlformats.org/officeDocument/2006/relationships" xmlns:p="http://schemas.openxmlformats.org/presentationml/2006/main">
+  <p:cSld>
+    <p:bg>
+      <p:bgPr>
+        <a:blipFill rotWithShape="1">
+          <a:blip r:embed="rId2">
+            <a:duotone>
+              <a:schemeClr val="bg2">
+                <a:shade val="80000"/>
+                <a:lumMod val="80000"/>
+              </a:schemeClr>
+              <a:schemeClr val="bg2">
+                <a:tint val="98000"/>
+              </a:schemeClr>
+            </a:duotone>
+          </a:blip>
+          <a:stretch/>
+        </a:blipFill>
+        <a:effectLst/>
+      </p:bgPr>
+    </p:bg>
+    <p:spTree>
+      <p:nvGrpSpPr>
+        <p:cNvPr id="1" name=""/>
+        <p:cNvGrpSpPr/>
+        <p:nvPr/>
+      </p:nvGrpSpPr>
+      <p:grpSpPr>
+        <a:xfrm>
+          <a:off x="0" y="0"/>
+          <a:ext cx="0" cy="0"/>
+          <a:chOff x="0" y="0"/>
+          <a:chExt cx="0" cy="0"/>
+        </a:xfrm>
+      </p:grpSpPr>
+      <p:sp useBgFill="1">
+        <p:nvSpPr>
+          <p:cNvPr id="8" name="Rectangle 7">
+            <a:extLst>
+              <a:ext uri="{FF2B5EF4-FFF2-40B4-BE49-F238E27FC236}">
+                <a16:creationId xmlns:a16="http://schemas.microsoft.com/office/drawing/2014/main" id="{9A6C2C86-63BF-47D5-AA3F-905111A238E2}"/>
+              </a:ext>
+              <a:ext uri="{C183D7F6-B498-43B3-948B-1728B52AA6E4}">
+                <adec:decorative xmlns:adec="http://schemas.microsoft.com/office/drawing/2017/decorative" val="1"/>
+              </a:ext>
+            </a:extLst>
+          </p:cNvPr>
+          <p:cNvSpPr>
+            <a:spLocks noGrp="1" noRot="1" noChangeAspect="1" noMove="1" noResize="1" noEditPoints="1" noAdjustHandles="1" noChangeArrowheads="1" noChangeShapeType="1" noTextEdit="1"/>
+          </p:cNvSpPr>
+          <p:nvPr>
+            <p:extLst>
+              <p:ext uri="{386F3935-93C4-4BCD-93E2-E3B085C9AB24}">
+                <p16:designElem xmlns:p16="http://schemas.microsoft.com/office/powerpoint/2015/main" val="1"/>
+              </p:ext>
+            </p:extLst>
+          </p:nvPr>
+        </p:nvSpPr>
+        <p:spPr>
+          <a:xfrm>
+            <a:off x="0" y="0"/>
+            <a:ext cx="12192000" cy="6858000"/>
+          </a:xfrm>
+          <a:prstGeom prst="rect">
+            <a:avLst/>
+          </a:prstGeom>
+          <a:ln>
+            <a:noFill/>
+          </a:ln>
+        </p:spPr>
+        <p:style>
+          <a:lnRef idx="2">
+            <a:schemeClr val="accent1">
+              <a:shade val="50000"/>
+            </a:schemeClr>
+          </a:lnRef>
+          <a:fillRef idx="1">
+            <a:schemeClr val="accent1"/>
+          </a:fillRef>
+          <a:effectRef idx="0">
+            <a:schemeClr val="accent1"/>
+          </a:effectRef>
+          <a:fontRef idx="minor">
+            <a:schemeClr val="lt1"/>
+          </a:fontRef>
+        </p:style>
+        <p:txBody>
+          <a:bodyPr rtlCol="0" anchor="ctr"/>
+          <a:lstStyle/>
+          <a:p>
+            <a:pPr algn="ctr"/>
+            <a:endParaRPr lang="en-US"/>
+          </a:p>
+        </p:txBody>
+      </p:sp>
+      <p:sp>
+        <p:nvSpPr>
+          <p:cNvPr id="2" name="Nadpis 1">
+            <a:extLst>
+              <a:ext uri="{FF2B5EF4-FFF2-40B4-BE49-F238E27FC236}">
+                <a16:creationId xmlns:a16="http://schemas.microsoft.com/office/drawing/2014/main" id="{6C959CBC-F40B-E704-A222-9151F1743F46}"/>
+              </a:ext>
+            </a:extLst>
+          </p:cNvPr>
+          <p:cNvSpPr>
+            <a:spLocks noGrp="1"/>
+          </p:cNvSpPr>
+          <p:nvPr>
+            <p:ph type="title"/>
+          </p:nvPr>
+        </p:nvSpPr>
+        <p:spPr>
+          <a:xfrm>
+            <a:off x="834013" y="1115568"/>
+            <a:ext cx="3487616" cy="4626864"/>
+          </a:xfrm>
+        </p:spPr>
+        <p:txBody>
+          <a:bodyPr>
+            <a:normAutofit/>
+          </a:bodyPr>
+          <a:lstStyle/>
+          <a:p>
+            <a:pPr algn="l"/>
+            <a:r>
+              <a:rPr lang="cs-CZ" sz="3200" dirty="0">
+                <a:latin typeface="Rockwell Nova" panose="02060503020205020403" pitchFamily="18" charset="0"/>
+              </a:rPr>
+              <a:t>Obsah</a:t>
+            </a:r>
+            <a:endParaRPr lang="en-US" sz="3200" dirty="0">
+              <a:latin typeface="Rockwell Nova" panose="02060503020205020403" pitchFamily="18" charset="0"/>
+            </a:endParaRPr>
+          </a:p>
+        </p:txBody>
+      </p:sp>
+      <p:cxnSp>
+        <p:nvCxnSpPr>
+          <p:cNvPr id="10" name="Straight Connector 9">
+            <a:extLst>
+              <a:ext uri="{FF2B5EF4-FFF2-40B4-BE49-F238E27FC236}">
+                <a16:creationId xmlns:a16="http://schemas.microsoft.com/office/drawing/2014/main" id="{425A0768-3044-4AA9-A889-D2CAA68C517A}"/>
+              </a:ext>
+              <a:ext uri="{C183D7F6-B498-43B3-948B-1728B52AA6E4}">
+                <adec:decorative xmlns:adec="http://schemas.microsoft.com/office/drawing/2017/decorative" val="1"/>
+              </a:ext>
+            </a:extLst>
+          </p:cNvPr>
+          <p:cNvCxnSpPr>
+            <a:cxnSpLocks noGrp="1" noRot="1" noChangeAspect="1" noMove="1" noResize="1" noEditPoints="1" noAdjustHandles="1" noChangeArrowheads="1" noChangeShapeType="1"/>
+          </p:cNvCxnSpPr>
+          <p:nvPr>
+            <p:extLst>
+              <p:ext uri="{386F3935-93C4-4BCD-93E2-E3B085C9AB24}">
+                <p16:designElem xmlns:p16="http://schemas.microsoft.com/office/powerpoint/2015/main" val="1"/>
+              </p:ext>
+            </p:extLst>
+          </p:nvPr>
+        </p:nvCxnSpPr>
+        <p:spPr>
+          <a:xfrm>
+            <a:off x="4654605" y="2057400"/>
+            <a:ext cx="0" cy="2743200"/>
+          </a:xfrm>
+          <a:prstGeom prst="line">
+            <a:avLst/>
+          </a:prstGeom>
+          <a:ln w="19050">
+            <a:solidFill>
+              <a:schemeClr val="tx2"/>
+            </a:solidFill>
+          </a:ln>
+        </p:spPr>
+        <p:style>
+          <a:lnRef idx="1">
+            <a:schemeClr val="accent1"/>
+          </a:lnRef>
+          <a:fillRef idx="0">
+            <a:schemeClr val="accent1"/>
+          </a:fillRef>
+          <a:effectRef idx="0">
+            <a:schemeClr val="accent1"/>
+          </a:effectRef>
+          <a:fontRef idx="minor">
+            <a:schemeClr val="tx1"/>
+          </a:fontRef>
+        </p:style>
+      </p:cxnSp>
+      <p:sp>
+        <p:nvSpPr>
+          <p:cNvPr id="3" name="Zástupný obsah 2">
+            <a:extLst>
+              <a:ext uri="{FF2B5EF4-FFF2-40B4-BE49-F238E27FC236}">
+                <a16:creationId xmlns:a16="http://schemas.microsoft.com/office/drawing/2014/main" id="{B746159B-1122-48DD-C70C-6A58F2F32CC3}"/>
+              </a:ext>
+            </a:extLst>
+          </p:cNvPr>
+          <p:cNvSpPr>
+            <a:spLocks noGrp="1"/>
+          </p:cNvSpPr>
+          <p:nvPr>
+            <p:ph idx="1"/>
+          </p:nvPr>
+        </p:nvSpPr>
+        <p:spPr>
+          <a:xfrm>
+            <a:off x="5105398" y="1115568"/>
+            <a:ext cx="6245352" cy="4626864"/>
+          </a:xfrm>
+        </p:spPr>
+        <p:txBody>
+          <a:bodyPr anchor="ctr">
+            <a:normAutofit/>
+          </a:bodyPr>
+          <a:lstStyle/>
+          <a:p>
+            <a:r>
+              <a:rPr lang="cs-CZ" sz="2400" dirty="0">
+                <a:latin typeface="Rockwell Nova" panose="02060503020205020403" pitchFamily="18" charset="0"/>
+              </a:rPr>
+              <a:t>Základy HTML</a:t>
+            </a:r>
+          </a:p>
+          <a:p>
+            <a:r>
+              <a:rPr lang="cs-CZ" sz="2400" dirty="0">
+                <a:latin typeface="Rockwell Nova" panose="02060503020205020403" pitchFamily="18" charset="0"/>
+              </a:rPr>
+              <a:t>Stylování s CSS</a:t>
+            </a:r>
+          </a:p>
+          <a:p>
+            <a:r>
+              <a:rPr lang="cs-CZ" sz="2400" dirty="0">
+                <a:latin typeface="Rockwell Nova" panose="02060503020205020403" pitchFamily="18" charset="0"/>
+              </a:rPr>
+              <a:t>Responzivní design s Media </a:t>
+            </a:r>
+            <a:r>
+              <a:rPr lang="cs-CZ" sz="2400" dirty="0" err="1">
+                <a:latin typeface="Rockwell Nova" panose="02060503020205020403" pitchFamily="18" charset="0"/>
+              </a:rPr>
+              <a:t>Query</a:t>
+            </a:r>
+            <a:endParaRPr lang="cs-CZ" sz="2400" dirty="0">
+              <a:latin typeface="Rockwell Nova" panose="02060503020205020403" pitchFamily="18" charset="0"/>
+            </a:endParaRPr>
+          </a:p>
+          <a:p>
+            <a:r>
+              <a:rPr lang="cs-CZ" sz="2400" dirty="0">
+                <a:latin typeface="Rockwell Nova" panose="02060503020205020403" pitchFamily="18" charset="0"/>
+              </a:rPr>
+              <a:t>Písmo ve WWW</a:t>
+            </a:r>
+          </a:p>
+          <a:p>
+            <a:r>
+              <a:rPr lang="cs-CZ" sz="2400" dirty="0">
+                <a:latin typeface="Rockwell Nova" panose="02060503020205020403" pitchFamily="18" charset="0"/>
+              </a:rPr>
+              <a:t>Interaktivita s </a:t>
+            </a:r>
+            <a:r>
+              <a:rPr lang="cs-CZ" sz="2400" dirty="0" err="1">
+                <a:latin typeface="Rockwell Nova" panose="02060503020205020403" pitchFamily="18" charset="0"/>
+              </a:rPr>
+              <a:t>JavaScriptem</a:t>
+            </a:r>
+            <a:endParaRPr lang="cs-CZ" sz="2400" dirty="0">
+              <a:latin typeface="Rockwell Nova" panose="02060503020205020403" pitchFamily="18" charset="0"/>
+            </a:endParaRPr>
+          </a:p>
+        </p:txBody>
+      </p:sp>
+    </p:spTree>
+    <p:extLst>
+      <p:ext uri="{BB962C8B-B14F-4D97-AF65-F5344CB8AC3E}">
+        <p14:creationId xmlns:p14="http://schemas.microsoft.com/office/powerpoint/2010/main" val="1384809627"/>
+      </p:ext>
+    </p:extLst>
+  </p:cSld>
+  <p:clrMapOvr>
+    <a:masterClrMapping/>
+  </p:clrMapOvr>
+  <mc:AlternateContent xmlns:mc="http://schemas.openxmlformats.org/markup-compatibility/2006">
+    <mc:Choice xmlns:p14="http://schemas.microsoft.com/office/powerpoint/2010/main" Requires="p14">
+      <p:transition p14:dur="20">
+        <p:dissolve/>
+      </p:transition>
+    </mc:Choice>
+    <mc:Fallback>
+      <p:transition>
+        <p:dissolve/>
+      </p:transition>
+    </mc:Fallback>
+  </mc:AlternateContent>
+</p:sld>
+</file>
+
+<file path=ppt/slides/slide20.xml><?xml version="1.0" encoding="utf-8"?>
 <p:sld xmlns:a="http://schemas.openxmlformats.org/drawingml/2006/main" xmlns:r="http://schemas.openxmlformats.org/officeDocument/2006/relationships" xmlns:p="http://schemas.openxmlformats.org/presentationml/2006/main">
   <p:cSld>
     <p:spTree>
@@ -8326,31 +8932,24 @@
   <p:clrMapOvr>
     <a:masterClrMapping/>
   </p:clrMapOvr>
+  <mc:AlternateContent xmlns:mc="http://schemas.openxmlformats.org/markup-compatibility/2006">
+    <mc:Choice xmlns:p14="http://schemas.microsoft.com/office/powerpoint/2010/main" Requires="p14">
+      <p:transition p14:dur="10">
+        <p:dissolve/>
+      </p:transition>
+    </mc:Choice>
+    <mc:Fallback>
+      <p:transition>
+        <p:dissolve/>
+      </p:transition>
+    </mc:Fallback>
+  </mc:AlternateContent>
 </p:sld>
 </file>
 
-<file path=ppt/slides/slide2.xml><?xml version="1.0" encoding="utf-8"?>
+<file path=ppt/slides/slide21.xml><?xml version="1.0" encoding="utf-8"?>
 <p:sld xmlns:a="http://schemas.openxmlformats.org/drawingml/2006/main" xmlns:r="http://schemas.openxmlformats.org/officeDocument/2006/relationships" xmlns:p="http://schemas.openxmlformats.org/presentationml/2006/main">
   <p:cSld>
-    <p:bg>
-      <p:bgPr>
-        <a:blipFill rotWithShape="1">
-          <a:blip r:embed="rId2">
-            <a:duotone>
-              <a:schemeClr val="bg2">
-                <a:shade val="80000"/>
-                <a:lumMod val="80000"/>
-              </a:schemeClr>
-              <a:schemeClr val="bg2">
-                <a:tint val="98000"/>
-              </a:schemeClr>
-            </a:duotone>
-          </a:blip>
-          <a:stretch/>
-        </a:blipFill>
-        <a:effectLst/>
-      </p:bgPr>
-    </p:bg>
     <p:spTree>
       <p:nvGrpSpPr>
         <p:cNvPr id="1" name=""/>
@@ -8365,242 +8964,195 @@
           <a:chExt cx="0" cy="0"/>
         </a:xfrm>
       </p:grpSpPr>
-      <p:sp useBgFill="1">
-        <p:nvSpPr>
-          <p:cNvPr id="8" name="Rectangle 7">
+      <p:sp>
+        <p:nvSpPr>
+          <p:cNvPr id="4" name="Nadpis 3">
             <a:extLst>
               <a:ext uri="{FF2B5EF4-FFF2-40B4-BE49-F238E27FC236}">
-                <a16:creationId xmlns:a16="http://schemas.microsoft.com/office/drawing/2014/main" id="{9A6C2C86-63BF-47D5-AA3F-905111A238E2}"/>
-              </a:ext>
-              <a:ext uri="{C183D7F6-B498-43B3-948B-1728B52AA6E4}">
-                <adec:decorative xmlns:adec="http://schemas.microsoft.com/office/drawing/2017/decorative" val="1"/>
+                <a16:creationId xmlns:a16="http://schemas.microsoft.com/office/drawing/2014/main" id="{1F88A45C-8EEE-9699-68D4-00478E9536BC}"/>
               </a:ext>
             </a:extLst>
           </p:cNvPr>
           <p:cNvSpPr>
-            <a:spLocks noGrp="1" noRot="1" noChangeAspect="1" noMove="1" noResize="1" noEditPoints="1" noAdjustHandles="1" noChangeArrowheads="1" noChangeShapeType="1" noTextEdit="1"/>
-          </p:cNvSpPr>
-          <p:nvPr>
-            <p:extLst>
-              <p:ext uri="{386F3935-93C4-4BCD-93E2-E3B085C9AB24}">
-                <p16:designElem xmlns:p16="http://schemas.microsoft.com/office/powerpoint/2015/main" val="1"/>
-              </p:ext>
-            </p:extLst>
-          </p:nvPr>
-        </p:nvSpPr>
+            <a:spLocks noGrp="1"/>
+          </p:cNvSpPr>
+          <p:nvPr>
+            <p:ph type="title"/>
+          </p:nvPr>
+        </p:nvSpPr>
+        <p:spPr/>
+        <p:txBody>
+          <a:bodyPr/>
+          <a:lstStyle/>
+          <a:p>
+            <a:r>
+              <a:rPr lang="cs-CZ" dirty="0"/>
+              <a:t>Konec</a:t>
+            </a:r>
+          </a:p>
+        </p:txBody>
+      </p:sp>
+      <p:pic>
+        <p:nvPicPr>
+          <p:cNvPr id="16" name="Zástupný obsah 15" descr="Obsah obrázku oblečení, text, boty, kreslené&#10;&#10;Popis byl vytvořen automaticky">
+            <a:extLst>
+              <a:ext uri="{FF2B5EF4-FFF2-40B4-BE49-F238E27FC236}">
+                <a16:creationId xmlns:a16="http://schemas.microsoft.com/office/drawing/2014/main" id="{D189E236-A76E-28AC-2463-8C504726A6EB}"/>
+              </a:ext>
+            </a:extLst>
+          </p:cNvPr>
+          <p:cNvPicPr>
+            <a:picLocks noGrp="1" noChangeAspect="1"/>
+          </p:cNvPicPr>
+          <p:nvPr>
+            <p:ph idx="1"/>
+          </p:nvPr>
+        </p:nvPicPr>
+        <p:blipFill>
+          <a:blip r:embed="rId2">
+            <a:extLst>
+              <a:ext uri="{28A0092B-C50C-407E-A947-70E740481C1C}">
+                <a14:useLocalDpi xmlns:a14="http://schemas.microsoft.com/office/drawing/2010/main" val="0"/>
+              </a:ext>
+            </a:extLst>
+          </a:blip>
+          <a:stretch>
+            <a:fillRect/>
+          </a:stretch>
+        </p:blipFill>
         <p:spPr>
           <a:xfrm>
-            <a:off x="0" y="0"/>
-            <a:ext cx="12192000" cy="6858000"/>
+            <a:off x="4013114" y="2574517"/>
+            <a:ext cx="4155124" cy="4059237"/>
+          </a:xfrm>
+        </p:spPr>
+      </p:pic>
+      <p:sp>
+        <p:nvSpPr>
+          <p:cNvPr id="17" name="Nadpis 3">
+            <a:extLst>
+              <a:ext uri="{FF2B5EF4-FFF2-40B4-BE49-F238E27FC236}">
+                <a16:creationId xmlns:a16="http://schemas.microsoft.com/office/drawing/2014/main" id="{2C349CD9-2C26-CBDD-136C-F1984A67210C}"/>
+              </a:ext>
+            </a:extLst>
+          </p:cNvPr>
+          <p:cNvSpPr txBox="1">
+            <a:spLocks/>
+          </p:cNvSpPr>
+          <p:nvPr/>
+        </p:nvSpPr>
+        <p:spPr>
+          <a:xfrm>
+            <a:off x="924443" y="1408612"/>
+            <a:ext cx="10353762" cy="970450"/>
           </a:xfrm>
           <a:prstGeom prst="rect">
             <a:avLst/>
           </a:prstGeom>
-          <a:ln>
-            <a:noFill/>
-          </a:ln>
+          <a:effectLst>
+            <a:outerShdw blurRad="25400" dir="17880000">
+              <a:srgbClr val="000000">
+                <a:alpha val="46000"/>
+              </a:srgbClr>
+            </a:outerShdw>
+          </a:effectLst>
         </p:spPr>
-        <p:style>
-          <a:lnRef idx="2">
-            <a:schemeClr val="accent1">
-              <a:shade val="50000"/>
-            </a:schemeClr>
-          </a:lnRef>
-          <a:fillRef idx="1">
-            <a:schemeClr val="accent1"/>
-          </a:fillRef>
-          <a:effectRef idx="0">
-            <a:schemeClr val="accent1"/>
-          </a:effectRef>
-          <a:fontRef idx="minor">
-            <a:schemeClr val="lt1"/>
-          </a:fontRef>
-        </p:style>
-        <p:txBody>
-          <a:bodyPr rtlCol="0" anchor="ctr"/>
-          <a:lstStyle/>
-          <a:p>
-            <a:pPr algn="ctr"/>
-            <a:endParaRPr lang="en-US"/>
-          </a:p>
-        </p:txBody>
-      </p:sp>
-      <p:sp>
-        <p:nvSpPr>
-          <p:cNvPr id="2" name="Nadpis 1">
-            <a:extLst>
-              <a:ext uri="{FF2B5EF4-FFF2-40B4-BE49-F238E27FC236}">
-                <a16:creationId xmlns:a16="http://schemas.microsoft.com/office/drawing/2014/main" id="{6C959CBC-F40B-E704-A222-9151F1743F46}"/>
-              </a:ext>
-            </a:extLst>
-          </p:cNvPr>
-          <p:cNvSpPr>
-            <a:spLocks noGrp="1"/>
-          </p:cNvSpPr>
-          <p:nvPr>
-            <p:ph type="title"/>
-          </p:nvPr>
-        </p:nvSpPr>
-        <p:spPr>
-          <a:xfrm>
-            <a:off x="834013" y="1115568"/>
-            <a:ext cx="3487616" cy="4626864"/>
-          </a:xfrm>
-        </p:spPr>
-        <p:txBody>
-          <a:bodyPr>
+        <p:txBody>
+          <a:bodyPr vert="horz" lIns="91440" tIns="45720" rIns="91440" bIns="45720" rtlCol="0" anchor="ctr">
             <a:normAutofit/>
           </a:bodyPr>
-          <a:lstStyle/>
-          <a:p>
-            <a:pPr algn="l"/>
-            <a:r>
-              <a:rPr lang="cs-CZ" sz="3200" dirty="0">
-                <a:latin typeface="Rockwell Nova" panose="02060503020205020403" pitchFamily="18" charset="0"/>
-              </a:rPr>
-              <a:t>Obsah</a:t>
-            </a:r>
-            <a:endParaRPr lang="en-US" sz="3200" dirty="0">
-              <a:latin typeface="Rockwell Nova" panose="02060503020205020403" pitchFamily="18" charset="0"/>
-            </a:endParaRPr>
-          </a:p>
-        </p:txBody>
-      </p:sp>
-      <p:cxnSp>
-        <p:nvCxnSpPr>
-          <p:cNvPr id="10" name="Straight Connector 9">
-            <a:extLst>
-              <a:ext uri="{FF2B5EF4-FFF2-40B4-BE49-F238E27FC236}">
-                <a16:creationId xmlns:a16="http://schemas.microsoft.com/office/drawing/2014/main" id="{425A0768-3044-4AA9-A889-D2CAA68C517A}"/>
-              </a:ext>
-              <a:ext uri="{C183D7F6-B498-43B3-948B-1728B52AA6E4}">
-                <adec:decorative xmlns:adec="http://schemas.microsoft.com/office/drawing/2017/decorative" val="1"/>
-              </a:ext>
-            </a:extLst>
-          </p:cNvPr>
-          <p:cNvCxnSpPr>
-            <a:cxnSpLocks noGrp="1" noRot="1" noChangeAspect="1" noMove="1" noResize="1" noEditPoints="1" noAdjustHandles="1" noChangeArrowheads="1" noChangeShapeType="1"/>
-          </p:cNvCxnSpPr>
-          <p:nvPr>
-            <p:extLst>
-              <p:ext uri="{386F3935-93C4-4BCD-93E2-E3B085C9AB24}">
-                <p16:designElem xmlns:p16="http://schemas.microsoft.com/office/powerpoint/2015/main" val="1"/>
-              </p:ext>
-            </p:extLst>
-          </p:nvPr>
-        </p:nvCxnSpPr>
-        <p:spPr>
-          <a:xfrm>
-            <a:off x="4654605" y="2057400"/>
-            <a:ext cx="0" cy="2743200"/>
-          </a:xfrm>
-          <a:prstGeom prst="line">
-            <a:avLst/>
-          </a:prstGeom>
-          <a:ln w="19050">
-            <a:solidFill>
-              <a:schemeClr val="tx2"/>
-            </a:solidFill>
-          </a:ln>
-        </p:spPr>
-        <p:style>
-          <a:lnRef idx="1">
-            <a:schemeClr val="accent1"/>
-          </a:lnRef>
-          <a:fillRef idx="0">
-            <a:schemeClr val="accent1"/>
-          </a:fillRef>
-          <a:effectRef idx="0">
-            <a:schemeClr val="accent1"/>
-          </a:effectRef>
-          <a:fontRef idx="minor">
-            <a:schemeClr val="tx1"/>
-          </a:fontRef>
-        </p:style>
-      </p:cxnSp>
-      <p:sp>
-        <p:nvSpPr>
-          <p:cNvPr id="3" name="Zástupný obsah 2">
-            <a:extLst>
-              <a:ext uri="{FF2B5EF4-FFF2-40B4-BE49-F238E27FC236}">
-                <a16:creationId xmlns:a16="http://schemas.microsoft.com/office/drawing/2014/main" id="{B746159B-1122-48DD-C70C-6A58F2F32CC3}"/>
-              </a:ext>
-            </a:extLst>
-          </p:cNvPr>
-          <p:cNvSpPr>
-            <a:spLocks noGrp="1"/>
-          </p:cNvSpPr>
-          <p:nvPr>
-            <p:ph idx="1"/>
-          </p:nvPr>
-        </p:nvSpPr>
-        <p:spPr>
-          <a:xfrm>
-            <a:off x="5105398" y="1115568"/>
-            <a:ext cx="6245352" cy="4626864"/>
-          </a:xfrm>
-        </p:spPr>
-        <p:txBody>
-          <a:bodyPr anchor="ctr">
-            <a:normAutofit/>
-          </a:bodyPr>
-          <a:lstStyle/>
-          <a:p>
-            <a:r>
-              <a:rPr lang="cs-CZ" sz="2400" dirty="0">
-                <a:latin typeface="Rockwell Nova" panose="02060503020205020403" pitchFamily="18" charset="0"/>
-              </a:rPr>
-              <a:t>Základy HTML</a:t>
-            </a:r>
-          </a:p>
-          <a:p>
-            <a:r>
-              <a:rPr lang="cs-CZ" sz="2400" dirty="0">
-                <a:latin typeface="Rockwell Nova" panose="02060503020205020403" pitchFamily="18" charset="0"/>
-              </a:rPr>
-              <a:t>Stylování s CSS</a:t>
-            </a:r>
-          </a:p>
-          <a:p>
-            <a:r>
-              <a:rPr lang="cs-CZ" sz="2400" dirty="0">
-                <a:latin typeface="Rockwell Nova" panose="02060503020205020403" pitchFamily="18" charset="0"/>
-              </a:rPr>
-              <a:t>Responzivní design s Media </a:t>
-            </a:r>
-            <a:r>
-              <a:rPr lang="cs-CZ" sz="2400" dirty="0" err="1">
-                <a:latin typeface="Rockwell Nova" panose="02060503020205020403" pitchFamily="18" charset="0"/>
-              </a:rPr>
-              <a:t>Query</a:t>
-            </a:r>
-            <a:endParaRPr lang="cs-CZ" sz="2400" dirty="0">
-              <a:latin typeface="Rockwell Nova" panose="02060503020205020403" pitchFamily="18" charset="0"/>
-            </a:endParaRPr>
-          </a:p>
-          <a:p>
-            <a:r>
-              <a:rPr lang="cs-CZ" sz="2400" dirty="0">
-                <a:latin typeface="Rockwell Nova" panose="02060503020205020403" pitchFamily="18" charset="0"/>
-              </a:rPr>
-              <a:t>Interaktivita s </a:t>
-            </a:r>
-            <a:r>
-              <a:rPr lang="cs-CZ" sz="2400" dirty="0" err="1">
-                <a:latin typeface="Rockwell Nova" panose="02060503020205020403" pitchFamily="18" charset="0"/>
-              </a:rPr>
-              <a:t>JavaScriptem</a:t>
-            </a:r>
-            <a:endParaRPr lang="cs-CZ" sz="2400" dirty="0">
-              <a:latin typeface="Rockwell Nova" panose="02060503020205020403" pitchFamily="18" charset="0"/>
-            </a:endParaRPr>
-          </a:p>
-          <a:p>
-            <a:r>
-              <a:rPr lang="cs-CZ" sz="2000" dirty="0">
-                <a:latin typeface="Rockwell Nova" panose="02060503020205020403" pitchFamily="18" charset="0"/>
-              </a:rPr>
-              <a:t>Písmo ve WWW</a:t>
+          <a:lstStyle>
+            <a:lvl1pPr algn="ctr" defTabSz="457200" rtl="0" eaLnBrk="1" latinLnBrk="0" hangingPunct="1">
+              <a:spcBef>
+                <a:spcPct val="0"/>
+              </a:spcBef>
+              <a:buNone/>
+              <a:defRPr sz="4000" kern="1200">
+                <a:ln>
+                  <a:solidFill>
+                    <a:schemeClr val="bg1">
+                      <a:lumMod val="75000"/>
+                      <a:lumOff val="25000"/>
+                      <a:alpha val="10000"/>
+                    </a:schemeClr>
+                  </a:solidFill>
+                </a:ln>
+                <a:solidFill>
+                  <a:schemeClr val="tx2"/>
+                </a:solidFill>
+                <a:effectLst>
+                  <a:outerShdw blurRad="9525" dist="25400" dir="14640000" algn="tl" rotWithShape="0">
+                    <a:schemeClr val="bg1">
+                      <a:alpha val="30000"/>
+                    </a:schemeClr>
+                  </a:outerShdw>
+                </a:effectLst>
+                <a:latin typeface="+mj-lt"/>
+                <a:ea typeface="+mj-ea"/>
+                <a:cs typeface="Trebuchet MS"/>
+              </a:defRPr>
+            </a:lvl1pPr>
+            <a:lvl2pPr eaLnBrk="1" hangingPunct="1">
+              <a:defRPr>
+                <a:solidFill>
+                  <a:schemeClr val="tx2"/>
+                </a:solidFill>
+              </a:defRPr>
+            </a:lvl2pPr>
+            <a:lvl3pPr eaLnBrk="1" hangingPunct="1">
+              <a:defRPr>
+                <a:solidFill>
+                  <a:schemeClr val="tx2"/>
+                </a:solidFill>
+              </a:defRPr>
+            </a:lvl3pPr>
+            <a:lvl4pPr eaLnBrk="1" hangingPunct="1">
+              <a:defRPr>
+                <a:solidFill>
+                  <a:schemeClr val="tx2"/>
+                </a:solidFill>
+              </a:defRPr>
+            </a:lvl4pPr>
+            <a:lvl5pPr eaLnBrk="1" hangingPunct="1">
+              <a:defRPr>
+                <a:solidFill>
+                  <a:schemeClr val="tx2"/>
+                </a:solidFill>
+              </a:defRPr>
+            </a:lvl5pPr>
+            <a:lvl6pPr eaLnBrk="1" hangingPunct="1">
+              <a:defRPr>
+                <a:solidFill>
+                  <a:schemeClr val="tx2"/>
+                </a:solidFill>
+              </a:defRPr>
+            </a:lvl6pPr>
+            <a:lvl7pPr eaLnBrk="1" hangingPunct="1">
+              <a:defRPr>
+                <a:solidFill>
+                  <a:schemeClr val="tx2"/>
+                </a:solidFill>
+              </a:defRPr>
+            </a:lvl7pPr>
+            <a:lvl8pPr eaLnBrk="1" hangingPunct="1">
+              <a:defRPr>
+                <a:solidFill>
+                  <a:schemeClr val="tx2"/>
+                </a:solidFill>
+              </a:defRPr>
+            </a:lvl8pPr>
+            <a:lvl9pPr eaLnBrk="1" hangingPunct="1">
+              <a:defRPr>
+                <a:solidFill>
+                  <a:schemeClr val="tx2"/>
+                </a:solidFill>
+              </a:defRPr>
+            </a:lvl9pPr>
+          </a:lstStyle>
+          <a:p>
+            <a:r>
+              <a:rPr lang="cs-CZ" sz="2400" dirty="0"/>
+              <a:t>Děkujeme za pozornost</a:t>
             </a:r>
           </a:p>
         </p:txBody>
@@ -8608,38 +9160,31 @@
     </p:spTree>
     <p:extLst>
       <p:ext uri="{BB962C8B-B14F-4D97-AF65-F5344CB8AC3E}">
-        <p14:creationId xmlns:p14="http://schemas.microsoft.com/office/powerpoint/2010/main" val="1384809627"/>
+        <p14:creationId xmlns:p14="http://schemas.microsoft.com/office/powerpoint/2010/main" val="3943845193"/>
       </p:ext>
     </p:extLst>
   </p:cSld>
   <p:clrMapOvr>
     <a:masterClrMapping/>
   </p:clrMapOvr>
+  <mc:AlternateContent xmlns:mc="http://schemas.openxmlformats.org/markup-compatibility/2006">
+    <mc:Choice xmlns:p14="http://schemas.microsoft.com/office/powerpoint/2010/main" Requires="p14">
+      <p:transition spd="slow" p14:dur="1200">
+        <p:dissolve/>
+      </p:transition>
+    </mc:Choice>
+    <mc:Fallback>
+      <p:transition spd="slow">
+        <p:dissolve/>
+      </p:transition>
+    </mc:Fallback>
+  </mc:AlternateContent>
 </p:sld>
 </file>
 
-<file path=ppt/slides/slide20.xml><?xml version="1.0" encoding="utf-8"?>
+<file path=ppt/slides/slide22.xml><?xml version="1.0" encoding="utf-8"?>
 <p:sld xmlns:a="http://schemas.openxmlformats.org/drawingml/2006/main" xmlns:r="http://schemas.openxmlformats.org/officeDocument/2006/relationships" xmlns:p="http://schemas.openxmlformats.org/presentationml/2006/main">
   <p:cSld>
-    <p:bg>
-      <p:bgPr>
-        <a:blipFill rotWithShape="1">
-          <a:blip r:embed="rId2">
-            <a:duotone>
-              <a:schemeClr val="bg2">
-                <a:shade val="80000"/>
-                <a:lumMod val="80000"/>
-              </a:schemeClr>
-              <a:schemeClr val="bg2">
-                <a:tint val="98000"/>
-              </a:schemeClr>
-            </a:duotone>
-          </a:blip>
-          <a:stretch/>
-        </a:blipFill>
-        <a:effectLst/>
-      </p:bgPr>
-    </p:bg>
     <p:spTree>
       <p:nvGrpSpPr>
         <p:cNvPr id="1" name=""/>
@@ -8654,332 +9199,73 @@
           <a:chExt cx="0" cy="0"/>
         </a:xfrm>
       </p:grpSpPr>
-      <p:sp useBgFill="1">
-        <p:nvSpPr>
-          <p:cNvPr id="8" name="Rectangle 7">
+      <p:sp>
+        <p:nvSpPr>
+          <p:cNvPr id="2" name="Nadpis 1">
             <a:extLst>
               <a:ext uri="{FF2B5EF4-FFF2-40B4-BE49-F238E27FC236}">
-                <a16:creationId xmlns:a16="http://schemas.microsoft.com/office/drawing/2014/main" id="{9A6C2C86-63BF-47D5-AA3F-905111A238E2}"/>
-              </a:ext>
-              <a:ext uri="{C183D7F6-B498-43B3-948B-1728B52AA6E4}">
-                <adec:decorative xmlns:adec="http://schemas.microsoft.com/office/drawing/2017/decorative" val="1"/>
+                <a16:creationId xmlns:a16="http://schemas.microsoft.com/office/drawing/2014/main" id="{5E590F65-355C-9235-972A-AF23B42C68D2}"/>
               </a:ext>
             </a:extLst>
           </p:cNvPr>
           <p:cNvSpPr>
-            <a:spLocks noGrp="1" noRot="1" noChangeAspect="1" noMove="1" noResize="1" noEditPoints="1" noAdjustHandles="1" noChangeArrowheads="1" noChangeShapeType="1" noTextEdit="1"/>
-          </p:cNvSpPr>
-          <p:nvPr>
-            <p:extLst>
-              <p:ext uri="{386F3935-93C4-4BCD-93E2-E3B085C9AB24}">
-                <p16:designElem xmlns:p16="http://schemas.microsoft.com/office/powerpoint/2015/main" val="1"/>
-              </p:ext>
-            </p:extLst>
-          </p:nvPr>
-        </p:nvSpPr>
-        <p:spPr>
-          <a:xfrm>
-            <a:off x="0" y="0"/>
-            <a:ext cx="12192000" cy="6858000"/>
-          </a:xfrm>
-          <a:prstGeom prst="rect">
-            <a:avLst/>
-          </a:prstGeom>
-          <a:ln>
-            <a:noFill/>
-          </a:ln>
-        </p:spPr>
-        <p:style>
-          <a:lnRef idx="2">
-            <a:schemeClr val="accent1">
-              <a:shade val="50000"/>
-            </a:schemeClr>
-          </a:lnRef>
-          <a:fillRef idx="1">
-            <a:schemeClr val="accent1"/>
-          </a:fillRef>
-          <a:effectRef idx="0">
-            <a:schemeClr val="accent1"/>
-          </a:effectRef>
-          <a:fontRef idx="minor">
-            <a:schemeClr val="lt1"/>
-          </a:fontRef>
-        </p:style>
-        <p:txBody>
-          <a:bodyPr rtlCol="0" anchor="ctr"/>
+            <a:spLocks noGrp="1"/>
+          </p:cNvSpPr>
+          <p:nvPr>
+            <p:ph type="title"/>
+          </p:nvPr>
+        </p:nvSpPr>
+        <p:spPr/>
+        <p:txBody>
+          <a:bodyPr/>
           <a:lstStyle/>
           <a:p>
-            <a:pPr algn="ctr"/>
-            <a:endParaRPr lang="en-US"/>
-          </a:p>
-        </p:txBody>
-      </p:sp>
-      <p:sp>
-        <p:nvSpPr>
-          <p:cNvPr id="2" name="Nadpis 1">
+            <a:r>
+              <a:rPr lang="cs-CZ" dirty="0"/>
+              <a:t>Kočka na uklidnění</a:t>
+            </a:r>
+          </a:p>
+        </p:txBody>
+      </p:sp>
+      <p:pic>
+        <p:nvPicPr>
+          <p:cNvPr id="5" name="Zástupný obsah 4" descr="Obsah obrázku savec, Malé a středně velké kočky, Kočkovití, kočka&#10;&#10;Popis byl vytvořen automaticky">
             <a:extLst>
               <a:ext uri="{FF2B5EF4-FFF2-40B4-BE49-F238E27FC236}">
-                <a16:creationId xmlns:a16="http://schemas.microsoft.com/office/drawing/2014/main" id="{483313DA-9A7C-8865-2F11-113FE31B30CE}"/>
+                <a16:creationId xmlns:a16="http://schemas.microsoft.com/office/drawing/2014/main" id="{96FC5FFA-F9F8-9D17-D5C1-C765CCAAA5BF}"/>
               </a:ext>
             </a:extLst>
           </p:cNvPr>
-          <p:cNvSpPr>
-            <a:spLocks noGrp="1"/>
-          </p:cNvSpPr>
-          <p:nvPr>
-            <p:ph type="title"/>
-          </p:nvPr>
-        </p:nvSpPr>
+          <p:cNvPicPr>
+            <a:picLocks noGrp="1" noChangeAspect="1"/>
+          </p:cNvPicPr>
+          <p:nvPr>
+            <p:ph idx="1"/>
+          </p:nvPr>
+        </p:nvPicPr>
+        <p:blipFill>
+          <a:blip r:embed="rId2">
+            <a:extLst>
+              <a:ext uri="{28A0092B-C50C-407E-A947-70E740481C1C}">
+                <a14:useLocalDpi xmlns:a14="http://schemas.microsoft.com/office/drawing/2010/main" val="0"/>
+              </a:ext>
+            </a:extLst>
+          </a:blip>
+          <a:stretch>
+            <a:fillRect/>
+          </a:stretch>
+        </p:blipFill>
         <p:spPr>
           <a:xfrm>
-            <a:off x="678079" y="1115568"/>
-            <a:ext cx="3751130" cy="4626864"/>
+            <a:off x="2483027" y="1731963"/>
+            <a:ext cx="7216421" cy="4059237"/>
           </a:xfrm>
         </p:spPr>
-        <p:txBody>
-          <a:bodyPr>
-            <a:normAutofit/>
-          </a:bodyPr>
-          <a:lstStyle/>
-          <a:p>
-            <a:r>
-              <a:rPr lang="cs-CZ" sz="3600" dirty="0">
-                <a:latin typeface="Rockwell Nova" panose="02060503020205020403" pitchFamily="18" charset="0"/>
-              </a:rPr>
-              <a:t>Písmo ve WWW</a:t>
-            </a:r>
-            <a:endParaRPr lang="en-US" sz="3600" dirty="0">
-              <a:latin typeface="Rockwell Nova" panose="02060503020205020403" pitchFamily="18" charset="0"/>
-            </a:endParaRPr>
-          </a:p>
-        </p:txBody>
-      </p:sp>
-      <p:cxnSp>
-        <p:nvCxnSpPr>
-          <p:cNvPr id="10" name="Straight Connector 9">
-            <a:extLst>
-              <a:ext uri="{FF2B5EF4-FFF2-40B4-BE49-F238E27FC236}">
-                <a16:creationId xmlns:a16="http://schemas.microsoft.com/office/drawing/2014/main" id="{425A0768-3044-4AA9-A889-D2CAA68C517A}"/>
-              </a:ext>
-              <a:ext uri="{C183D7F6-B498-43B3-948B-1728B52AA6E4}">
-                <adec:decorative xmlns:adec="http://schemas.microsoft.com/office/drawing/2017/decorative" val="1"/>
-              </a:ext>
-            </a:extLst>
-          </p:cNvPr>
-          <p:cNvCxnSpPr>
-            <a:cxnSpLocks noGrp="1" noRot="1" noChangeAspect="1" noMove="1" noResize="1" noEditPoints="1" noAdjustHandles="1" noChangeArrowheads="1" noChangeShapeType="1"/>
-          </p:cNvCxnSpPr>
-          <p:nvPr>
-            <p:extLst>
-              <p:ext uri="{386F3935-93C4-4BCD-93E2-E3B085C9AB24}">
-                <p16:designElem xmlns:p16="http://schemas.microsoft.com/office/powerpoint/2015/main" val="1"/>
-              </p:ext>
-            </p:extLst>
-          </p:nvPr>
-        </p:nvCxnSpPr>
-        <p:spPr>
-          <a:xfrm>
-            <a:off x="4654605" y="2057400"/>
-            <a:ext cx="0" cy="2743200"/>
-          </a:xfrm>
-          <a:prstGeom prst="line">
-            <a:avLst/>
-          </a:prstGeom>
-          <a:ln w="19050">
-            <a:solidFill>
-              <a:schemeClr val="tx2"/>
-            </a:solidFill>
-          </a:ln>
-        </p:spPr>
-        <p:style>
-          <a:lnRef idx="1">
-            <a:schemeClr val="accent1"/>
-          </a:lnRef>
-          <a:fillRef idx="0">
-            <a:schemeClr val="accent1"/>
-          </a:fillRef>
-          <a:effectRef idx="0">
-            <a:schemeClr val="accent1"/>
-          </a:effectRef>
-          <a:fontRef idx="minor">
-            <a:schemeClr val="tx1"/>
-          </a:fontRef>
-        </p:style>
-      </p:cxnSp>
-      <p:sp>
-        <p:nvSpPr>
-          <p:cNvPr id="3" name="Zástupný obsah 2">
-            <a:extLst>
-              <a:ext uri="{FF2B5EF4-FFF2-40B4-BE49-F238E27FC236}">
-                <a16:creationId xmlns:a16="http://schemas.microsoft.com/office/drawing/2014/main" id="{7CD64CB9-A6B9-C715-7721-8BEB6D2AAD8A}"/>
-              </a:ext>
-            </a:extLst>
-          </p:cNvPr>
-          <p:cNvSpPr>
-            <a:spLocks noGrp="1"/>
-          </p:cNvSpPr>
-          <p:nvPr>
-            <p:ph idx="1"/>
-          </p:nvPr>
-        </p:nvSpPr>
-        <p:spPr>
-          <a:xfrm>
-            <a:off x="5105398" y="1115568"/>
-            <a:ext cx="6245352" cy="4626864"/>
-          </a:xfrm>
-        </p:spPr>
-        <p:txBody>
-          <a:bodyPr anchor="ctr">
-            <a:normAutofit/>
-          </a:bodyPr>
-          <a:lstStyle/>
-          <a:p>
-            <a:r>
-              <a:rPr lang="cs-CZ" dirty="0">
-                <a:latin typeface="Rockwell Nova" panose="02060503020205020403" pitchFamily="18" charset="0"/>
-              </a:rPr>
-              <a:t>Skriptovací jazyk pro interaktivitu na webových stránkách</a:t>
-            </a:r>
-          </a:p>
-          <a:p>
-            <a:r>
-              <a:rPr lang="cs-CZ" dirty="0">
-                <a:latin typeface="Rockwell Nova" panose="02060503020205020403" pitchFamily="18" charset="0"/>
-              </a:rPr>
-              <a:t>Běží v prohlížeči klienta</a:t>
-            </a:r>
-          </a:p>
-          <a:p>
-            <a:r>
-              <a:rPr lang="en-US" dirty="0" err="1">
-                <a:latin typeface="Rockwell Nova" panose="02060503020205020403" pitchFamily="18" charset="0"/>
-              </a:rPr>
-              <a:t>Umístěn</a:t>
-            </a:r>
-            <a:r>
-              <a:rPr lang="en-US" dirty="0">
-                <a:latin typeface="Rockwell Nova" panose="02060503020205020403" pitchFamily="18" charset="0"/>
-              </a:rPr>
-              <a:t> </a:t>
-            </a:r>
-            <a:r>
-              <a:rPr lang="en-US" dirty="0" err="1">
-                <a:latin typeface="Rockwell Nova" panose="02060503020205020403" pitchFamily="18" charset="0"/>
-              </a:rPr>
-              <a:t>ve</a:t>
-            </a:r>
-            <a:r>
-              <a:rPr lang="en-US" dirty="0">
-                <a:latin typeface="Rockwell Nova" panose="02060503020205020403" pitchFamily="18" charset="0"/>
-              </a:rPr>
-              <a:t> </a:t>
-            </a:r>
-            <a:r>
-              <a:rPr lang="en-US" dirty="0" err="1">
-                <a:latin typeface="Rockwell Nova" panose="02060503020205020403" pitchFamily="18" charset="0"/>
-              </a:rPr>
-              <a:t>vedlejších</a:t>
-            </a:r>
-            <a:r>
-              <a:rPr lang="en-US" dirty="0">
-                <a:latin typeface="Rockwell Nova" panose="02060503020205020403" pitchFamily="18" charset="0"/>
-              </a:rPr>
-              <a:t> </a:t>
-            </a:r>
-            <a:r>
-              <a:rPr lang="en-US" dirty="0" err="1">
-                <a:latin typeface="Rockwell Nova" panose="02060503020205020403" pitchFamily="18" charset="0"/>
-              </a:rPr>
-              <a:t>souborech</a:t>
-            </a:r>
-            <a:r>
-              <a:rPr lang="en-US" dirty="0">
-                <a:latin typeface="Rockwell Nova" panose="02060503020205020403" pitchFamily="18" charset="0"/>
-              </a:rPr>
-              <a:t> </a:t>
-            </a:r>
-            <a:r>
-              <a:rPr lang="en-US" dirty="0" err="1">
-                <a:latin typeface="Rockwell Nova" panose="02060503020205020403" pitchFamily="18" charset="0"/>
-              </a:rPr>
-              <a:t>nebo</a:t>
-            </a:r>
-            <a:r>
-              <a:rPr lang="en-US" dirty="0">
-                <a:latin typeface="Rockwell Nova" panose="02060503020205020403" pitchFamily="18" charset="0"/>
-              </a:rPr>
-              <a:t> </a:t>
-            </a:r>
-            <a:r>
-              <a:rPr lang="en-US" dirty="0" err="1">
-                <a:latin typeface="Rockwell Nova" panose="02060503020205020403" pitchFamily="18" charset="0"/>
-              </a:rPr>
-              <a:t>přímo</a:t>
-            </a:r>
-            <a:r>
-              <a:rPr lang="en-US" dirty="0">
-                <a:latin typeface="Rockwell Nova" panose="02060503020205020403" pitchFamily="18" charset="0"/>
-              </a:rPr>
-              <a:t> </a:t>
-            </a:r>
-            <a:r>
-              <a:rPr lang="en-US" dirty="0" err="1">
-                <a:latin typeface="Rockwell Nova" panose="02060503020205020403" pitchFamily="18" charset="0"/>
-              </a:rPr>
-              <a:t>vložen</a:t>
-            </a:r>
-            <a:r>
-              <a:rPr lang="en-US" dirty="0">
-                <a:latin typeface="Rockwell Nova" panose="02060503020205020403" pitchFamily="18" charset="0"/>
-              </a:rPr>
-              <a:t> v HTML </a:t>
-            </a:r>
-            <a:r>
-              <a:rPr lang="en-US" dirty="0" err="1">
-                <a:latin typeface="Rockwell Nova" panose="02060503020205020403" pitchFamily="18" charset="0"/>
-              </a:rPr>
-              <a:t>pomocí</a:t>
-            </a:r>
-            <a:r>
-              <a:rPr lang="en-US" dirty="0">
-                <a:latin typeface="Rockwell Nova" panose="02060503020205020403" pitchFamily="18" charset="0"/>
-              </a:rPr>
-              <a:t> </a:t>
-            </a:r>
-            <a:r>
-              <a:rPr lang="en-US" dirty="0" err="1">
-                <a:latin typeface="Rockwell Nova" panose="02060503020205020403" pitchFamily="18" charset="0"/>
-              </a:rPr>
-              <a:t>značky</a:t>
-            </a:r>
-            <a:r>
-              <a:rPr lang="en-US" dirty="0">
-                <a:latin typeface="Rockwell Nova" panose="02060503020205020403" pitchFamily="18" charset="0"/>
-              </a:rPr>
-              <a:t> &lt;</a:t>
-            </a:r>
-            <a:r>
-              <a:rPr lang="cs-CZ" dirty="0">
-                <a:latin typeface="Rockwell Nova" panose="02060503020205020403" pitchFamily="18" charset="0"/>
-              </a:rPr>
-              <a:t>script</a:t>
-            </a:r>
-            <a:r>
-              <a:rPr lang="en-US" dirty="0">
-                <a:latin typeface="Rockwell Nova" panose="02060503020205020403" pitchFamily="18" charset="0"/>
-              </a:rPr>
-              <a:t>&gt;</a:t>
-            </a:r>
-          </a:p>
-          <a:p>
-            <a:endParaRPr lang="en-US" dirty="0"/>
-          </a:p>
-        </p:txBody>
-      </p:sp>
+      </p:pic>
     </p:spTree>
     <p:extLst>
       <p:ext uri="{BB962C8B-B14F-4D97-AF65-F5344CB8AC3E}">
-        <p14:creationId xmlns:p14="http://schemas.microsoft.com/office/powerpoint/2010/main" val="876299066"/>
+        <p14:creationId xmlns:p14="http://schemas.microsoft.com/office/powerpoint/2010/main" val="2925289812"/>
       </p:ext>
     </p:extLst>
   </p:cSld>
@@ -9204,6 +9490,18 @@
   <p:clrMapOvr>
     <a:masterClrMapping/>
   </p:clrMapOvr>
+  <mc:AlternateContent xmlns:mc="http://schemas.openxmlformats.org/markup-compatibility/2006">
+    <mc:Choice xmlns:p14="http://schemas.microsoft.com/office/powerpoint/2010/main" Requires="p14">
+      <p:transition p14:dur="20">
+        <p:dissolve/>
+      </p:transition>
+    </mc:Choice>
+    <mc:Fallback>
+      <p:transition>
+        <p:dissolve/>
+      </p:transition>
+    </mc:Fallback>
+  </mc:AlternateContent>
 </p:sld>
 </file>
 
@@ -9498,6 +9796,18 @@
   <p:clrMapOvr>
     <a:masterClrMapping/>
   </p:clrMapOvr>
+  <mc:AlternateContent xmlns:mc="http://schemas.openxmlformats.org/markup-compatibility/2006">
+    <mc:Choice xmlns:p14="http://schemas.microsoft.com/office/powerpoint/2010/main" Requires="p14">
+      <p:transition p14:dur="20">
+        <p:dissolve/>
+      </p:transition>
+    </mc:Choice>
+    <mc:Fallback>
+      <p:transition>
+        <p:dissolve/>
+      </p:transition>
+    </mc:Fallback>
+  </mc:AlternateContent>
 </p:sld>
 </file>
 
@@ -9679,6 +9989,18 @@
   <p:clrMapOvr>
     <a:masterClrMapping/>
   </p:clrMapOvr>
+  <mc:AlternateContent xmlns:mc="http://schemas.openxmlformats.org/markup-compatibility/2006">
+    <mc:Choice xmlns:p14="http://schemas.microsoft.com/office/powerpoint/2010/main" Requires="p14">
+      <p:transition p14:dur="20">
+        <p:dissolve/>
+      </p:transition>
+    </mc:Choice>
+    <mc:Fallback>
+      <p:transition>
+        <p:dissolve/>
+      </p:transition>
+    </mc:Fallback>
+  </mc:AlternateContent>
 </p:sld>
 </file>
 
@@ -9854,6 +10176,18 @@
   <p:clrMapOvr>
     <a:masterClrMapping/>
   </p:clrMapOvr>
+  <mc:AlternateContent xmlns:mc="http://schemas.openxmlformats.org/markup-compatibility/2006">
+    <mc:Choice xmlns:p14="http://schemas.microsoft.com/office/powerpoint/2010/main" Requires="p14">
+      <p:transition p14:dur="20">
+        <p:dissolve/>
+      </p:transition>
+    </mc:Choice>
+    <mc:Fallback>
+      <p:transition>
+        <p:dissolve/>
+      </p:transition>
+    </mc:Fallback>
+  </mc:AlternateContent>
 </p:sld>
 </file>
 
@@ -10070,6 +10404,18 @@
   <p:clrMapOvr>
     <a:masterClrMapping/>
   </p:clrMapOvr>
+  <mc:AlternateContent xmlns:mc="http://schemas.openxmlformats.org/markup-compatibility/2006">
+    <mc:Choice xmlns:p14="http://schemas.microsoft.com/office/powerpoint/2010/main" Requires="p14">
+      <p:transition p14:dur="20">
+        <p:dissolve/>
+      </p:transition>
+    </mc:Choice>
+    <mc:Fallback>
+      <p:transition>
+        <p:dissolve/>
+      </p:transition>
+    </mc:Fallback>
+  </mc:AlternateContent>
 </p:sld>
 </file>
 
@@ -10294,6 +10640,18 @@
   <p:clrMapOvr>
     <a:masterClrMapping/>
   </p:clrMapOvr>
+  <mc:AlternateContent xmlns:mc="http://schemas.openxmlformats.org/markup-compatibility/2006">
+    <mc:Choice xmlns:p14="http://schemas.microsoft.com/office/powerpoint/2010/main" Requires="p14">
+      <p:transition p14:dur="20">
+        <p:dissolve/>
+      </p:transition>
+    </mc:Choice>
+    <mc:Fallback>
+      <p:transition>
+        <p:dissolve/>
+      </p:transition>
+    </mc:Fallback>
+  </mc:AlternateContent>
 </p:sld>
 </file>
 
@@ -10464,6 +10822,18 @@
   <p:clrMapOvr>
     <a:masterClrMapping/>
   </p:clrMapOvr>
+  <mc:AlternateContent xmlns:mc="http://schemas.openxmlformats.org/markup-compatibility/2006">
+    <mc:Choice xmlns:p14="http://schemas.microsoft.com/office/powerpoint/2010/main" Requires="p14">
+      <p:transition p14:dur="20">
+        <p:dissolve/>
+      </p:transition>
+    </mc:Choice>
+    <mc:Fallback>
+      <p:transition>
+        <p:dissolve/>
+      </p:transition>
+    </mc:Fallback>
+  </mc:AlternateContent>
 </p:sld>
 </file>
 

</xml_diff>

<commit_message>
Even in death Moder still cries...
</commit_message>
<xml_diff>
--- a/NavrhWEB.pptx
+++ b/NavrhWEB.pptx
@@ -25,8 +25,7 @@
     <p:sldId id="271" r:id="rId19"/>
     <p:sldId id="272" r:id="rId20"/>
     <p:sldId id="273" r:id="rId21"/>
-    <p:sldId id="277" r:id="rId22"/>
-    <p:sldId id="278" r:id="rId23"/>
+    <p:sldId id="278" r:id="rId22"/>
   </p:sldIdLst>
   <p:sldSz cx="12192000" cy="6858000"/>
   <p:notesSz cx="6858000" cy="9144000"/>
@@ -6126,13 +6125,13 @@
   <p:clrMapOvr>
     <a:masterClrMapping/>
   </p:clrMapOvr>
-  <mc:AlternateContent xmlns:mc="http://schemas.openxmlformats.org/markup-compatibility/2006">
-    <mc:Choice xmlns:p14="http://schemas.microsoft.com/office/powerpoint/2010/main" Requires="p14">
+  <mc:AlternateContent xmlns:mc="http://schemas.openxmlformats.org/markup-compatibility/2006" xmlns:p14="http://schemas.microsoft.com/office/powerpoint/2010/main">
+    <mc:Choice Requires="p14">
       <p:transition p14:dur="20">
         <p:dissolve/>
       </p:transition>
     </mc:Choice>
-    <mc:Fallback>
+    <mc:Fallback xmlns="">
       <p:transition>
         <p:dissolve/>
       </p:transition>
@@ -6341,13 +6340,13 @@
   <p:clrMapOvr>
     <a:masterClrMapping/>
   </p:clrMapOvr>
-  <mc:AlternateContent xmlns:mc="http://schemas.openxmlformats.org/markup-compatibility/2006">
-    <mc:Choice xmlns:p14="http://schemas.microsoft.com/office/powerpoint/2010/main" Requires="p14">
+  <mc:AlternateContent xmlns:mc="http://schemas.openxmlformats.org/markup-compatibility/2006" xmlns:p14="http://schemas.microsoft.com/office/powerpoint/2010/main">
+    <mc:Choice Requires="p14">
       <p:transition p14:dur="50">
         <p:dissolve/>
       </p:transition>
     </mc:Choice>
-    <mc:Fallback>
+    <mc:Fallback xmlns="">
       <p:transition>
         <p:dissolve/>
       </p:transition>
@@ -6547,13 +6546,13 @@
   <p:clrMapOvr>
     <a:masterClrMapping/>
   </p:clrMapOvr>
-  <mc:AlternateContent xmlns:mc="http://schemas.openxmlformats.org/markup-compatibility/2006">
-    <mc:Choice xmlns:p14="http://schemas.microsoft.com/office/powerpoint/2010/main" Requires="p14">
+  <mc:AlternateContent xmlns:mc="http://schemas.openxmlformats.org/markup-compatibility/2006" xmlns:p14="http://schemas.microsoft.com/office/powerpoint/2010/main">
+    <mc:Choice Requires="p14">
       <p:transition p14:dur="20">
         <p:dissolve/>
       </p:transition>
     </mc:Choice>
-    <mc:Fallback>
+    <mc:Fallback xmlns="">
       <p:transition>
         <p:dissolve/>
       </p:transition>
@@ -6832,13 +6831,13 @@
   <p:clrMapOvr>
     <a:masterClrMapping/>
   </p:clrMapOvr>
-  <mc:AlternateContent xmlns:mc="http://schemas.openxmlformats.org/markup-compatibility/2006">
-    <mc:Choice xmlns:p14="http://schemas.microsoft.com/office/powerpoint/2010/main" Requires="p14">
+  <mc:AlternateContent xmlns:mc="http://schemas.openxmlformats.org/markup-compatibility/2006" xmlns:p14="http://schemas.microsoft.com/office/powerpoint/2010/main">
+    <mc:Choice Requires="p14">
       <p:transition p14:dur="20">
         <p:dissolve/>
       </p:transition>
     </mc:Choice>
-    <mc:Fallback>
+    <mc:Fallback xmlns="">
       <p:transition>
         <p:dissolve/>
       </p:transition>
@@ -7034,13 +7033,13 @@
   <p:clrMapOvr>
     <a:masterClrMapping/>
   </p:clrMapOvr>
-  <mc:AlternateContent xmlns:mc="http://schemas.openxmlformats.org/markup-compatibility/2006">
-    <mc:Choice xmlns:p14="http://schemas.microsoft.com/office/powerpoint/2010/main" Requires="p14">
+  <mc:AlternateContent xmlns:mc="http://schemas.openxmlformats.org/markup-compatibility/2006" xmlns:p14="http://schemas.microsoft.com/office/powerpoint/2010/main">
+    <mc:Choice Requires="p14">
       <p:transition p14:dur="20">
         <p:dissolve/>
       </p:transition>
     </mc:Choice>
-    <mc:Fallback>
+    <mc:Fallback xmlns="">
       <p:transition>
         <p:dissolve/>
       </p:transition>
@@ -7242,13 +7241,13 @@
   <p:clrMapOvr>
     <a:masterClrMapping/>
   </p:clrMapOvr>
-  <mc:AlternateContent xmlns:mc="http://schemas.openxmlformats.org/markup-compatibility/2006">
-    <mc:Choice xmlns:p14="http://schemas.microsoft.com/office/powerpoint/2010/main" Requires="p14">
+  <mc:AlternateContent xmlns:mc="http://schemas.openxmlformats.org/markup-compatibility/2006" xmlns:p14="http://schemas.microsoft.com/office/powerpoint/2010/main">
+    <mc:Choice Requires="p14">
       <p:transition p14:dur="20">
         <p:dissolve/>
       </p:transition>
     </mc:Choice>
-    <mc:Fallback>
+    <mc:Fallback xmlns="">
       <p:transition>
         <p:dissolve/>
       </p:transition>
@@ -7480,13 +7479,13 @@
   <p:clrMapOvr>
     <a:masterClrMapping/>
   </p:clrMapOvr>
-  <mc:AlternateContent xmlns:mc="http://schemas.openxmlformats.org/markup-compatibility/2006">
-    <mc:Choice xmlns:p14="http://schemas.microsoft.com/office/powerpoint/2010/main" Requires="p14">
+  <mc:AlternateContent xmlns:mc="http://schemas.openxmlformats.org/markup-compatibility/2006" xmlns:p14="http://schemas.microsoft.com/office/powerpoint/2010/main">
+    <mc:Choice Requires="p14">
       <p:transition p14:dur="20">
         <p:dissolve/>
       </p:transition>
     </mc:Choice>
-    <mc:Fallback>
+    <mc:Fallback xmlns="">
       <p:transition>
         <p:dissolve/>
       </p:transition>
@@ -7663,13 +7662,13 @@
   <p:clrMapOvr>
     <a:masterClrMapping/>
   </p:clrMapOvr>
-  <mc:AlternateContent xmlns:mc="http://schemas.openxmlformats.org/markup-compatibility/2006">
-    <mc:Choice xmlns:p14="http://schemas.microsoft.com/office/powerpoint/2010/main" Requires="p14">
+  <mc:AlternateContent xmlns:mc="http://schemas.openxmlformats.org/markup-compatibility/2006" xmlns:p14="http://schemas.microsoft.com/office/powerpoint/2010/main">
+    <mc:Choice Requires="p14">
       <p:transition p14:dur="20">
         <p:dissolve/>
       </p:transition>
     </mc:Choice>
-    <mc:Fallback>
+    <mc:Fallback xmlns="">
       <p:transition>
         <p:dissolve/>
       </p:transition>
@@ -8047,13 +8046,13 @@
   <p:clrMapOvr>
     <a:masterClrMapping/>
   </p:clrMapOvr>
-  <mc:AlternateContent xmlns:mc="http://schemas.openxmlformats.org/markup-compatibility/2006">
-    <mc:Choice xmlns:p14="http://schemas.microsoft.com/office/powerpoint/2010/main" Requires="p14">
+  <mc:AlternateContent xmlns:mc="http://schemas.openxmlformats.org/markup-compatibility/2006" xmlns:p14="http://schemas.microsoft.com/office/powerpoint/2010/main">
+    <mc:Choice Requires="p14">
       <p:transition p14:dur="20">
         <p:dissolve/>
       </p:transition>
     </mc:Choice>
-    <mc:Fallback>
+    <mc:Fallback xmlns="">
       <p:transition>
         <p:dissolve/>
       </p:transition>
@@ -8265,13 +8264,13 @@
   <p:clrMapOvr>
     <a:masterClrMapping/>
   </p:clrMapOvr>
-  <mc:AlternateContent xmlns:mc="http://schemas.openxmlformats.org/markup-compatibility/2006">
-    <mc:Choice xmlns:p14="http://schemas.microsoft.com/office/powerpoint/2010/main" Requires="p14">
+  <mc:AlternateContent xmlns:mc="http://schemas.openxmlformats.org/markup-compatibility/2006" xmlns:p14="http://schemas.microsoft.com/office/powerpoint/2010/main">
+    <mc:Choice Requires="p14">
       <p:transition p14:dur="20">
         <p:dissolve/>
       </p:transition>
     </mc:Choice>
-    <mc:Fallback>
+    <mc:Fallback xmlns="">
       <p:transition>
         <p:dissolve/>
       </p:transition>
@@ -8486,13 +8485,13 @@
   <p:clrMapOvr>
     <a:masterClrMapping/>
   </p:clrMapOvr>
-  <mc:AlternateContent xmlns:mc="http://schemas.openxmlformats.org/markup-compatibility/2006">
-    <mc:Choice xmlns:p14="http://schemas.microsoft.com/office/powerpoint/2010/main" Requires="p14">
+  <mc:AlternateContent xmlns:mc="http://schemas.openxmlformats.org/markup-compatibility/2006" xmlns:p14="http://schemas.microsoft.com/office/powerpoint/2010/main">
+    <mc:Choice Requires="p14">
       <p:transition p14:dur="20">
         <p:dissolve/>
       </p:transition>
     </mc:Choice>
-    <mc:Fallback>
+    <mc:Fallback xmlns="">
       <p:transition>
         <p:dissolve/>
       </p:transition>
@@ -8787,13 +8786,13 @@
   <p:clrMapOvr>
     <a:masterClrMapping/>
   </p:clrMapOvr>
-  <mc:AlternateContent xmlns:mc="http://schemas.openxmlformats.org/markup-compatibility/2006">
-    <mc:Choice xmlns:p14="http://schemas.microsoft.com/office/powerpoint/2010/main" Requires="p14">
+  <mc:AlternateContent xmlns:mc="http://schemas.openxmlformats.org/markup-compatibility/2006" xmlns:p14="http://schemas.microsoft.com/office/powerpoint/2010/main">
+    <mc:Choice Requires="p14">
       <p:transition p14:dur="20">
         <p:dissolve/>
       </p:transition>
     </mc:Choice>
-    <mc:Fallback>
+    <mc:Fallback xmlns="">
       <p:transition>
         <p:dissolve/>
       </p:transition>
@@ -8932,13 +8931,13 @@
   <p:clrMapOvr>
     <a:masterClrMapping/>
   </p:clrMapOvr>
-  <mc:AlternateContent xmlns:mc="http://schemas.openxmlformats.org/markup-compatibility/2006">
-    <mc:Choice xmlns:p14="http://schemas.microsoft.com/office/powerpoint/2010/main" Requires="p14">
+  <mc:AlternateContent xmlns:mc="http://schemas.openxmlformats.org/markup-compatibility/2006" xmlns:p14="http://schemas.microsoft.com/office/powerpoint/2010/main">
+    <mc:Choice Requires="p14">
       <p:transition p14:dur="10">
         <p:dissolve/>
       </p:transition>
     </mc:Choice>
-    <mc:Fallback>
+    <mc:Fallback xmlns="">
       <p:transition>
         <p:dissolve/>
       </p:transition>
@@ -8966,10 +8965,10 @@
       </p:grpSpPr>
       <p:sp>
         <p:nvSpPr>
-          <p:cNvPr id="4" name="Nadpis 3">
+          <p:cNvPr id="2" name="Nadpis 1">
             <a:extLst>
               <a:ext uri="{FF2B5EF4-FFF2-40B4-BE49-F238E27FC236}">
-                <a16:creationId xmlns:a16="http://schemas.microsoft.com/office/drawing/2014/main" id="{1F88A45C-8EEE-9699-68D4-00478E9536BC}"/>
+                <a16:creationId xmlns:a16="http://schemas.microsoft.com/office/drawing/2014/main" id="{5E590F65-355C-9235-972A-AF23B42C68D2}"/>
               </a:ext>
             </a:extLst>
           </p:cNvPr>
@@ -8994,10 +8993,10 @@
       </p:sp>
       <p:pic>
         <p:nvPicPr>
-          <p:cNvPr id="16" name="Zástupný obsah 15" descr="Obsah obrázku oblečení, text, boty, kreslené&#10;&#10;Popis byl vytvořen automaticky">
+          <p:cNvPr id="5" name="Zástupný obsah 4" descr="Obsah obrázku savec, Malé a středně velké kočky, Kočkovití, kočka&#10;&#10;Popis byl vytvořen automaticky">
             <a:extLst>
               <a:ext uri="{FF2B5EF4-FFF2-40B4-BE49-F238E27FC236}">
-                <a16:creationId xmlns:a16="http://schemas.microsoft.com/office/drawing/2014/main" id="{D189E236-A76E-28AC-2463-8C504726A6EB}"/>
+                <a16:creationId xmlns:a16="http://schemas.microsoft.com/office/drawing/2014/main" id="{96FC5FFA-F9F8-9D17-D5C1-C765CCAAA5BF}"/>
               </a:ext>
             </a:extLst>
           </p:cNvPr>
@@ -9022,17 +9021,17 @@
         </p:blipFill>
         <p:spPr>
           <a:xfrm>
-            <a:off x="4013114" y="2574517"/>
-            <a:ext cx="4155124" cy="4059237"/>
+            <a:off x="2483027" y="1731963"/>
+            <a:ext cx="7216421" cy="4059237"/>
           </a:xfrm>
         </p:spPr>
       </p:pic>
       <p:sp>
         <p:nvSpPr>
-          <p:cNvPr id="17" name="Nadpis 3">
+          <p:cNvPr id="3" name="Nadpis 1">
             <a:extLst>
               <a:ext uri="{FF2B5EF4-FFF2-40B4-BE49-F238E27FC236}">
-                <a16:creationId xmlns:a16="http://schemas.microsoft.com/office/drawing/2014/main" id="{2C349CD9-2C26-CBDD-136C-F1984A67210C}"/>
+                <a16:creationId xmlns:a16="http://schemas.microsoft.com/office/drawing/2014/main" id="{32BE67A7-888D-ED94-6CD9-C7606F2FF120}"/>
               </a:ext>
             </a:extLst>
           </p:cNvPr>
@@ -9043,7 +9042,7 @@
         </p:nvSpPr>
         <p:spPr>
           <a:xfrm>
-            <a:off x="924443" y="1408612"/>
+            <a:off x="913795" y="5692923"/>
             <a:ext cx="10353762" cy="970450"/>
           </a:xfrm>
           <a:prstGeom prst="rect">
@@ -9151,117 +9150,12 @@
           </a:lstStyle>
           <a:p>
             <a:r>
-              <a:rPr lang="cs-CZ" sz="2400" dirty="0"/>
-              <a:t>Děkujeme za pozornost</a:t>
-            </a:r>
-          </a:p>
-        </p:txBody>
-      </p:sp>
-    </p:spTree>
-    <p:extLst>
-      <p:ext uri="{BB962C8B-B14F-4D97-AF65-F5344CB8AC3E}">
-        <p14:creationId xmlns:p14="http://schemas.microsoft.com/office/powerpoint/2010/main" val="3943845193"/>
-      </p:ext>
-    </p:extLst>
-  </p:cSld>
-  <p:clrMapOvr>
-    <a:masterClrMapping/>
-  </p:clrMapOvr>
-  <mc:AlternateContent xmlns:mc="http://schemas.openxmlformats.org/markup-compatibility/2006">
-    <mc:Choice xmlns:p14="http://schemas.microsoft.com/office/powerpoint/2010/main" Requires="p14">
-      <p:transition spd="slow" p14:dur="1200">
-        <p:dissolve/>
-      </p:transition>
-    </mc:Choice>
-    <mc:Fallback>
-      <p:transition spd="slow">
-        <p:dissolve/>
-      </p:transition>
-    </mc:Fallback>
-  </mc:AlternateContent>
-</p:sld>
-</file>
-
-<file path=ppt/slides/slide22.xml><?xml version="1.0" encoding="utf-8"?>
-<p:sld xmlns:a="http://schemas.openxmlformats.org/drawingml/2006/main" xmlns:r="http://schemas.openxmlformats.org/officeDocument/2006/relationships" xmlns:p="http://schemas.openxmlformats.org/presentationml/2006/main">
-  <p:cSld>
-    <p:spTree>
-      <p:nvGrpSpPr>
-        <p:cNvPr id="1" name=""/>
-        <p:cNvGrpSpPr/>
-        <p:nvPr/>
-      </p:nvGrpSpPr>
-      <p:grpSpPr>
-        <a:xfrm>
-          <a:off x="0" y="0"/>
-          <a:ext cx="0" cy="0"/>
-          <a:chOff x="0" y="0"/>
-          <a:chExt cx="0" cy="0"/>
-        </a:xfrm>
-      </p:grpSpPr>
-      <p:sp>
-        <p:nvSpPr>
-          <p:cNvPr id="2" name="Nadpis 1">
-            <a:extLst>
-              <a:ext uri="{FF2B5EF4-FFF2-40B4-BE49-F238E27FC236}">
-                <a16:creationId xmlns:a16="http://schemas.microsoft.com/office/drawing/2014/main" id="{5E590F65-355C-9235-972A-AF23B42C68D2}"/>
-              </a:ext>
-            </a:extLst>
-          </p:cNvPr>
-          <p:cNvSpPr>
-            <a:spLocks noGrp="1"/>
-          </p:cNvSpPr>
-          <p:nvPr>
-            <p:ph type="title"/>
-          </p:nvPr>
-        </p:nvSpPr>
-        <p:spPr/>
-        <p:txBody>
-          <a:bodyPr/>
-          <a:lstStyle/>
-          <a:p>
-            <a:r>
-              <a:rPr lang="cs-CZ" dirty="0"/>
-              <a:t>Kočka na uklidnění</a:t>
-            </a:r>
-          </a:p>
-        </p:txBody>
-      </p:sp>
-      <p:pic>
-        <p:nvPicPr>
-          <p:cNvPr id="5" name="Zástupný obsah 4" descr="Obsah obrázku savec, Malé a středně velké kočky, Kočkovití, kočka&#10;&#10;Popis byl vytvořen automaticky">
-            <a:extLst>
-              <a:ext uri="{FF2B5EF4-FFF2-40B4-BE49-F238E27FC236}">
-                <a16:creationId xmlns:a16="http://schemas.microsoft.com/office/drawing/2014/main" id="{96FC5FFA-F9F8-9D17-D5C1-C765CCAAA5BF}"/>
-              </a:ext>
-            </a:extLst>
-          </p:cNvPr>
-          <p:cNvPicPr>
-            <a:picLocks noGrp="1" noChangeAspect="1"/>
-          </p:cNvPicPr>
-          <p:nvPr>
-            <p:ph idx="1"/>
-          </p:nvPr>
-        </p:nvPicPr>
-        <p:blipFill>
-          <a:blip r:embed="rId2">
-            <a:extLst>
-              <a:ext uri="{28A0092B-C50C-407E-A947-70E740481C1C}">
-                <a14:useLocalDpi xmlns:a14="http://schemas.microsoft.com/office/drawing/2010/main" val="0"/>
-              </a:ext>
-            </a:extLst>
-          </a:blip>
-          <a:stretch>
-            <a:fillRect/>
-          </a:stretch>
-        </p:blipFill>
-        <p:spPr>
-          <a:xfrm>
-            <a:off x="2483027" y="1731963"/>
-            <a:ext cx="7216421" cy="4059237"/>
-          </a:xfrm>
-        </p:spPr>
-      </p:pic>
+              <a:rPr lang="cs-CZ" sz="2800" dirty="0"/>
+              <a:t>Kotě na uklidnění</a:t>
+            </a:r>
+          </a:p>
+        </p:txBody>
+      </p:sp>
     </p:spTree>
     <p:extLst>
       <p:ext uri="{BB962C8B-B14F-4D97-AF65-F5344CB8AC3E}">
@@ -9490,13 +9384,13 @@
   <p:clrMapOvr>
     <a:masterClrMapping/>
   </p:clrMapOvr>
-  <mc:AlternateContent xmlns:mc="http://schemas.openxmlformats.org/markup-compatibility/2006">
-    <mc:Choice xmlns:p14="http://schemas.microsoft.com/office/powerpoint/2010/main" Requires="p14">
+  <mc:AlternateContent xmlns:mc="http://schemas.openxmlformats.org/markup-compatibility/2006" xmlns:p14="http://schemas.microsoft.com/office/powerpoint/2010/main">
+    <mc:Choice Requires="p14">
       <p:transition p14:dur="20">
         <p:dissolve/>
       </p:transition>
     </mc:Choice>
-    <mc:Fallback>
+    <mc:Fallback xmlns="">
       <p:transition>
         <p:dissolve/>
       </p:transition>
@@ -9796,13 +9690,13 @@
   <p:clrMapOvr>
     <a:masterClrMapping/>
   </p:clrMapOvr>
-  <mc:AlternateContent xmlns:mc="http://schemas.openxmlformats.org/markup-compatibility/2006">
-    <mc:Choice xmlns:p14="http://schemas.microsoft.com/office/powerpoint/2010/main" Requires="p14">
+  <mc:AlternateContent xmlns:mc="http://schemas.openxmlformats.org/markup-compatibility/2006" xmlns:p14="http://schemas.microsoft.com/office/powerpoint/2010/main">
+    <mc:Choice Requires="p14">
       <p:transition p14:dur="20">
         <p:dissolve/>
       </p:transition>
     </mc:Choice>
-    <mc:Fallback>
+    <mc:Fallback xmlns="">
       <p:transition>
         <p:dissolve/>
       </p:transition>
@@ -9989,13 +9883,13 @@
   <p:clrMapOvr>
     <a:masterClrMapping/>
   </p:clrMapOvr>
-  <mc:AlternateContent xmlns:mc="http://schemas.openxmlformats.org/markup-compatibility/2006">
-    <mc:Choice xmlns:p14="http://schemas.microsoft.com/office/powerpoint/2010/main" Requires="p14">
+  <mc:AlternateContent xmlns:mc="http://schemas.openxmlformats.org/markup-compatibility/2006" xmlns:p14="http://schemas.microsoft.com/office/powerpoint/2010/main">
+    <mc:Choice Requires="p14">
       <p:transition p14:dur="20">
         <p:dissolve/>
       </p:transition>
     </mc:Choice>
-    <mc:Fallback>
+    <mc:Fallback xmlns="">
       <p:transition>
         <p:dissolve/>
       </p:transition>
@@ -10176,13 +10070,13 @@
   <p:clrMapOvr>
     <a:masterClrMapping/>
   </p:clrMapOvr>
-  <mc:AlternateContent xmlns:mc="http://schemas.openxmlformats.org/markup-compatibility/2006">
-    <mc:Choice xmlns:p14="http://schemas.microsoft.com/office/powerpoint/2010/main" Requires="p14">
+  <mc:AlternateContent xmlns:mc="http://schemas.openxmlformats.org/markup-compatibility/2006" xmlns:p14="http://schemas.microsoft.com/office/powerpoint/2010/main">
+    <mc:Choice Requires="p14">
       <p:transition p14:dur="20">
         <p:dissolve/>
       </p:transition>
     </mc:Choice>
-    <mc:Fallback>
+    <mc:Fallback xmlns="">
       <p:transition>
         <p:dissolve/>
       </p:transition>
@@ -10404,13 +10298,13 @@
   <p:clrMapOvr>
     <a:masterClrMapping/>
   </p:clrMapOvr>
-  <mc:AlternateContent xmlns:mc="http://schemas.openxmlformats.org/markup-compatibility/2006">
-    <mc:Choice xmlns:p14="http://schemas.microsoft.com/office/powerpoint/2010/main" Requires="p14">
+  <mc:AlternateContent xmlns:mc="http://schemas.openxmlformats.org/markup-compatibility/2006" xmlns:p14="http://schemas.microsoft.com/office/powerpoint/2010/main">
+    <mc:Choice Requires="p14">
       <p:transition p14:dur="20">
         <p:dissolve/>
       </p:transition>
     </mc:Choice>
-    <mc:Fallback>
+    <mc:Fallback xmlns="">
       <p:transition>
         <p:dissolve/>
       </p:transition>
@@ -10640,13 +10534,13 @@
   <p:clrMapOvr>
     <a:masterClrMapping/>
   </p:clrMapOvr>
-  <mc:AlternateContent xmlns:mc="http://schemas.openxmlformats.org/markup-compatibility/2006">
-    <mc:Choice xmlns:p14="http://schemas.microsoft.com/office/powerpoint/2010/main" Requires="p14">
+  <mc:AlternateContent xmlns:mc="http://schemas.openxmlformats.org/markup-compatibility/2006" xmlns:p14="http://schemas.microsoft.com/office/powerpoint/2010/main">
+    <mc:Choice Requires="p14">
       <p:transition p14:dur="20">
         <p:dissolve/>
       </p:transition>
     </mc:Choice>
-    <mc:Fallback>
+    <mc:Fallback xmlns="">
       <p:transition>
         <p:dissolve/>
       </p:transition>
@@ -10822,13 +10716,13 @@
   <p:clrMapOvr>
     <a:masterClrMapping/>
   </p:clrMapOvr>
-  <mc:AlternateContent xmlns:mc="http://schemas.openxmlformats.org/markup-compatibility/2006">
-    <mc:Choice xmlns:p14="http://schemas.microsoft.com/office/powerpoint/2010/main" Requires="p14">
+  <mc:AlternateContent xmlns:mc="http://schemas.openxmlformats.org/markup-compatibility/2006" xmlns:p14="http://schemas.microsoft.com/office/powerpoint/2010/main">
+    <mc:Choice Requires="p14">
       <p:transition p14:dur="20">
         <p:dissolve/>
       </p:transition>
     </mc:Choice>
-    <mc:Fallback>
+    <mc:Fallback xmlns="">
       <p:transition>
         <p:dissolve/>
       </p:transition>

</xml_diff>